<commit_message>
add TAv1.0 UI Wireframe
</commit_message>
<xml_diff>
--- a/doc/TAv1.0 UI wireframe.pptx
+++ b/doc/TAv1.0 UI wireframe.pptx
@@ -4,6 +4,15 @@
   <p:sldMasterIdLst>
     <p:sldMasterId id="2147483648" r:id="rId1"/>
   </p:sldMasterIdLst>
+  <p:sldIdLst>
+    <p:sldId id="256" r:id="rId2"/>
+    <p:sldId id="258" r:id="rId3"/>
+    <p:sldId id="257" r:id="rId4"/>
+    <p:sldId id="259" r:id="rId5"/>
+    <p:sldId id="260" r:id="rId6"/>
+    <p:sldId id="261" r:id="rId7"/>
+    <p:sldId id="262" r:id="rId8"/>
+  </p:sldIdLst>
   <p:sldSz cx="9144000" cy="6858000" type="screen4x3"/>
   <p:notesSz cx="6858000" cy="9144000"/>
   <p:defaultTextStyle>
@@ -285,7 +294,7 @@
           <a:p>
             <a:fld id="{5BBEAD13-0566-4C6C-97E7-55F17F24B09F}" type="datetimeFigureOut">
               <a:rPr lang="zh-TW" altLang="en-US" smtClean="0"/>
-              <a:t>2006/9/7</a:t>
+              <a:t>2014/2/17</a:t>
             </a:fld>
             <a:endParaRPr lang="zh-TW" altLang="en-US"/>
           </a:p>
@@ -450,7 +459,7 @@
           <a:p>
             <a:fld id="{5BBEAD13-0566-4C6C-97E7-55F17F24B09F}" type="datetimeFigureOut">
               <a:rPr lang="zh-TW" altLang="en-US" smtClean="0"/>
-              <a:t>2006/9/7</a:t>
+              <a:t>2014/2/17</a:t>
             </a:fld>
             <a:endParaRPr lang="zh-TW" altLang="en-US"/>
           </a:p>
@@ -625,7 +634,7 @@
           <a:p>
             <a:fld id="{5BBEAD13-0566-4C6C-97E7-55F17F24B09F}" type="datetimeFigureOut">
               <a:rPr lang="zh-TW" altLang="en-US" smtClean="0"/>
-              <a:t>2006/9/7</a:t>
+              <a:t>2014/2/17</a:t>
             </a:fld>
             <a:endParaRPr lang="zh-TW" altLang="en-US"/>
           </a:p>
@@ -790,7 +799,7 @@
           <a:p>
             <a:fld id="{5BBEAD13-0566-4C6C-97E7-55F17F24B09F}" type="datetimeFigureOut">
               <a:rPr lang="zh-TW" altLang="en-US" smtClean="0"/>
-              <a:t>2006/9/7</a:t>
+              <a:t>2014/2/17</a:t>
             </a:fld>
             <a:endParaRPr lang="zh-TW" altLang="en-US"/>
           </a:p>
@@ -1031,7 +1040,7 @@
           <a:p>
             <a:fld id="{5BBEAD13-0566-4C6C-97E7-55F17F24B09F}" type="datetimeFigureOut">
               <a:rPr lang="zh-TW" altLang="en-US" smtClean="0"/>
-              <a:t>2006/9/7</a:t>
+              <a:t>2014/2/17</a:t>
             </a:fld>
             <a:endParaRPr lang="zh-TW" altLang="en-US"/>
           </a:p>
@@ -1314,7 +1323,7 @@
           <a:p>
             <a:fld id="{5BBEAD13-0566-4C6C-97E7-55F17F24B09F}" type="datetimeFigureOut">
               <a:rPr lang="zh-TW" altLang="en-US" smtClean="0"/>
-              <a:t>2006/9/7</a:t>
+              <a:t>2014/2/17</a:t>
             </a:fld>
             <a:endParaRPr lang="zh-TW" altLang="en-US"/>
           </a:p>
@@ -1731,7 +1740,7 @@
           <a:p>
             <a:fld id="{5BBEAD13-0566-4C6C-97E7-55F17F24B09F}" type="datetimeFigureOut">
               <a:rPr lang="zh-TW" altLang="en-US" smtClean="0"/>
-              <a:t>2006/9/7</a:t>
+              <a:t>2014/2/17</a:t>
             </a:fld>
             <a:endParaRPr lang="zh-TW" altLang="en-US"/>
           </a:p>
@@ -1844,7 +1853,7 @@
           <a:p>
             <a:fld id="{5BBEAD13-0566-4C6C-97E7-55F17F24B09F}" type="datetimeFigureOut">
               <a:rPr lang="zh-TW" altLang="en-US" smtClean="0"/>
-              <a:t>2006/9/7</a:t>
+              <a:t>2014/2/17</a:t>
             </a:fld>
             <a:endParaRPr lang="zh-TW" altLang="en-US"/>
           </a:p>
@@ -1934,7 +1943,7 @@
           <a:p>
             <a:fld id="{5BBEAD13-0566-4C6C-97E7-55F17F24B09F}" type="datetimeFigureOut">
               <a:rPr lang="zh-TW" altLang="en-US" smtClean="0"/>
-              <a:t>2006/9/7</a:t>
+              <a:t>2014/2/17</a:t>
             </a:fld>
             <a:endParaRPr lang="zh-TW" altLang="en-US"/>
           </a:p>
@@ -2206,7 +2215,7 @@
           <a:p>
             <a:fld id="{5BBEAD13-0566-4C6C-97E7-55F17F24B09F}" type="datetimeFigureOut">
               <a:rPr lang="zh-TW" altLang="en-US" smtClean="0"/>
-              <a:t>2006/9/7</a:t>
+              <a:t>2014/2/17</a:t>
             </a:fld>
             <a:endParaRPr lang="zh-TW" altLang="en-US"/>
           </a:p>
@@ -2454,7 +2463,7 @@
           <a:p>
             <a:fld id="{5BBEAD13-0566-4C6C-97E7-55F17F24B09F}" type="datetimeFigureOut">
               <a:rPr lang="zh-TW" altLang="en-US" smtClean="0"/>
-              <a:t>2006/9/7</a:t>
+              <a:t>2014/2/17</a:t>
             </a:fld>
             <a:endParaRPr lang="zh-TW" altLang="en-US"/>
           </a:p>
@@ -2662,7 +2671,7 @@
           <a:p>
             <a:fld id="{5BBEAD13-0566-4C6C-97E7-55F17F24B09F}" type="datetimeFigureOut">
               <a:rPr lang="zh-TW" altLang="en-US" smtClean="0"/>
-              <a:t>2006/9/7</a:t>
+              <a:t>2014/2/17</a:t>
             </a:fld>
             <a:endParaRPr lang="zh-TW" altLang="en-US"/>
           </a:p>
@@ -3013,6 +3022,2685 @@
     </p:otherStyle>
   </p:txStyles>
 </p:sldMaster>
+</file>
+
+<file path=ppt/slides/slide1.xml><?xml version="1.0" encoding="utf-8"?>
+<p:sld xmlns:a="http://schemas.openxmlformats.org/drawingml/2006/main" xmlns:r="http://schemas.openxmlformats.org/officeDocument/2006/relationships" xmlns:p="http://schemas.openxmlformats.org/presentationml/2006/main">
+  <p:cSld>
+    <p:spTree>
+      <p:nvGrpSpPr>
+        <p:cNvPr id="1" name=""/>
+        <p:cNvGrpSpPr/>
+        <p:nvPr/>
+      </p:nvGrpSpPr>
+      <p:grpSpPr>
+        <a:xfrm>
+          <a:off x="0" y="0"/>
+          <a:ext cx="0" cy="0"/>
+          <a:chOff x="0" y="0"/>
+          <a:chExt cx="0" cy="0"/>
+        </a:xfrm>
+      </p:grpSpPr>
+      <p:sp>
+        <p:nvSpPr>
+          <p:cNvPr id="2" name="標題 1"/>
+          <p:cNvSpPr>
+            <a:spLocks noGrp="1"/>
+          </p:cNvSpPr>
+          <p:nvPr>
+            <p:ph type="ctrTitle"/>
+          </p:nvPr>
+        </p:nvSpPr>
+        <p:spPr/>
+        <p:txBody>
+          <a:bodyPr/>
+          <a:lstStyle/>
+          <a:p>
+            <a:r>
+              <a:rPr lang="en-US" altLang="zh-TW" dirty="0" smtClean="0"/>
+              <a:t>TAv1.0 UI Wireframe</a:t>
+            </a:r>
+            <a:endParaRPr lang="zh-TW" altLang="en-US" dirty="0"/>
+          </a:p>
+        </p:txBody>
+      </p:sp>
+      <p:sp>
+        <p:nvSpPr>
+          <p:cNvPr id="3" name="副標題 2"/>
+          <p:cNvSpPr>
+            <a:spLocks noGrp="1"/>
+          </p:cNvSpPr>
+          <p:nvPr>
+            <p:ph type="subTitle" idx="1"/>
+          </p:nvPr>
+        </p:nvSpPr>
+        <p:spPr/>
+        <p:txBody>
+          <a:bodyPr/>
+          <a:lstStyle/>
+          <a:p>
+            <a:r>
+              <a:rPr lang="en-US" altLang="zh-TW" dirty="0" smtClean="0"/>
+              <a:t>Samuel </a:t>
+            </a:r>
+            <a:r>
+              <a:rPr lang="en-US" altLang="zh-TW" dirty="0" err="1" smtClean="0"/>
+              <a:t>Hsin</a:t>
+            </a:r>
+            <a:endParaRPr lang="en-US" altLang="zh-TW" dirty="0" smtClean="0"/>
+          </a:p>
+          <a:p>
+            <a:r>
+              <a:rPr lang="en-US" altLang="zh-TW" dirty="0" smtClean="0"/>
+              <a:t>2014/2/17</a:t>
+            </a:r>
+            <a:endParaRPr lang="zh-TW" altLang="en-US" dirty="0"/>
+          </a:p>
+        </p:txBody>
+      </p:sp>
+    </p:spTree>
+    <p:extLst>
+      <p:ext uri="{BB962C8B-B14F-4D97-AF65-F5344CB8AC3E}">
+        <p14:creationId xmlns:p14="http://schemas.microsoft.com/office/powerpoint/2010/main" val="852149345"/>
+      </p:ext>
+    </p:extLst>
+  </p:cSld>
+  <p:clrMapOvr>
+    <a:masterClrMapping/>
+  </p:clrMapOvr>
+</p:sld>
+</file>
+
+<file path=ppt/slides/slide2.xml><?xml version="1.0" encoding="utf-8"?>
+<p:sld xmlns:a="http://schemas.openxmlformats.org/drawingml/2006/main" xmlns:r="http://schemas.openxmlformats.org/officeDocument/2006/relationships" xmlns:p="http://schemas.openxmlformats.org/presentationml/2006/main">
+  <p:cSld>
+    <p:spTree>
+      <p:nvGrpSpPr>
+        <p:cNvPr id="1" name=""/>
+        <p:cNvGrpSpPr/>
+        <p:nvPr/>
+      </p:nvGrpSpPr>
+      <p:grpSpPr>
+        <a:xfrm>
+          <a:off x="0" y="0"/>
+          <a:ext cx="0" cy="0"/>
+          <a:chOff x="0" y="0"/>
+          <a:chExt cx="0" cy="0"/>
+        </a:xfrm>
+      </p:grpSpPr>
+      <p:sp>
+        <p:nvSpPr>
+          <p:cNvPr id="2" name="標題 1"/>
+          <p:cNvSpPr>
+            <a:spLocks noGrp="1"/>
+          </p:cNvSpPr>
+          <p:nvPr>
+            <p:ph type="title"/>
+          </p:nvPr>
+        </p:nvSpPr>
+        <p:spPr/>
+        <p:txBody>
+          <a:bodyPr/>
+          <a:lstStyle/>
+          <a:p>
+            <a:r>
+              <a:rPr lang="en-US" altLang="zh-TW" dirty="0" smtClean="0"/>
+              <a:t>Assumptions</a:t>
+            </a:r>
+            <a:endParaRPr lang="zh-TW" altLang="en-US" dirty="0"/>
+          </a:p>
+        </p:txBody>
+      </p:sp>
+      <p:sp>
+        <p:nvSpPr>
+          <p:cNvPr id="3" name="內容版面配置區 2"/>
+          <p:cNvSpPr>
+            <a:spLocks noGrp="1"/>
+          </p:cNvSpPr>
+          <p:nvPr>
+            <p:ph idx="1"/>
+          </p:nvPr>
+        </p:nvSpPr>
+        <p:spPr/>
+        <p:txBody>
+          <a:bodyPr/>
+          <a:lstStyle/>
+          <a:p>
+            <a:r>
+              <a:rPr lang="en-US" altLang="zh-TW" dirty="0" smtClean="0"/>
+              <a:t>1. User already download app from google play and install it.</a:t>
+            </a:r>
+          </a:p>
+          <a:p>
+            <a:r>
+              <a:rPr lang="en-US" altLang="zh-TW" dirty="0" smtClean="0"/>
+              <a:t>2. User already open it.</a:t>
+            </a:r>
+            <a:endParaRPr lang="zh-TW" altLang="en-US" dirty="0"/>
+          </a:p>
+        </p:txBody>
+      </p:sp>
+    </p:spTree>
+    <p:extLst>
+      <p:ext uri="{BB962C8B-B14F-4D97-AF65-F5344CB8AC3E}">
+        <p14:creationId xmlns:p14="http://schemas.microsoft.com/office/powerpoint/2010/main" val="2973353054"/>
+      </p:ext>
+    </p:extLst>
+  </p:cSld>
+  <p:clrMapOvr>
+    <a:masterClrMapping/>
+  </p:clrMapOvr>
+</p:sld>
+</file>
+
+<file path=ppt/slides/slide3.xml><?xml version="1.0" encoding="utf-8"?>
+<p:sld xmlns:a="http://schemas.openxmlformats.org/drawingml/2006/main" xmlns:r="http://schemas.openxmlformats.org/officeDocument/2006/relationships" xmlns:p="http://schemas.openxmlformats.org/presentationml/2006/main">
+  <p:cSld>
+    <p:spTree>
+      <p:nvGrpSpPr>
+        <p:cNvPr id="1" name=""/>
+        <p:cNvGrpSpPr/>
+        <p:nvPr/>
+      </p:nvGrpSpPr>
+      <p:grpSpPr>
+        <a:xfrm>
+          <a:off x="0" y="0"/>
+          <a:ext cx="0" cy="0"/>
+          <a:chOff x="0" y="0"/>
+          <a:chExt cx="0" cy="0"/>
+        </a:xfrm>
+      </p:grpSpPr>
+      <p:sp>
+        <p:nvSpPr>
+          <p:cNvPr id="4" name="圓角矩形 3"/>
+          <p:cNvSpPr/>
+          <p:nvPr/>
+        </p:nvSpPr>
+        <p:spPr>
+          <a:xfrm>
+            <a:off x="2137990" y="116632"/>
+            <a:ext cx="4824536" cy="6624736"/>
+          </a:xfrm>
+          <a:prstGeom prst="roundRect">
+            <a:avLst/>
+          </a:prstGeom>
+        </p:spPr>
+        <p:style>
+          <a:lnRef idx="2">
+            <a:schemeClr val="accent1"/>
+          </a:lnRef>
+          <a:fillRef idx="1">
+            <a:schemeClr val="lt1"/>
+          </a:fillRef>
+          <a:effectRef idx="0">
+            <a:schemeClr val="accent1"/>
+          </a:effectRef>
+          <a:fontRef idx="minor">
+            <a:schemeClr val="dk1"/>
+          </a:fontRef>
+        </p:style>
+        <p:txBody>
+          <a:bodyPr rtlCol="0" anchor="ctr"/>
+          <a:lstStyle/>
+          <a:p>
+            <a:pPr algn="ctr"/>
+            <a:endParaRPr lang="zh-TW" altLang="en-US"/>
+          </a:p>
+        </p:txBody>
+      </p:sp>
+      <p:sp>
+        <p:nvSpPr>
+          <p:cNvPr id="5" name="矩形 4"/>
+          <p:cNvSpPr/>
+          <p:nvPr/>
+        </p:nvSpPr>
+        <p:spPr>
+          <a:xfrm>
+            <a:off x="2555776" y="620688"/>
+            <a:ext cx="4032448" cy="4464496"/>
+          </a:xfrm>
+          <a:prstGeom prst="rect">
+            <a:avLst/>
+          </a:prstGeom>
+        </p:spPr>
+        <p:style>
+          <a:lnRef idx="2">
+            <a:schemeClr val="accent1">
+              <a:shade val="50000"/>
+            </a:schemeClr>
+          </a:lnRef>
+          <a:fillRef idx="1">
+            <a:schemeClr val="accent1"/>
+          </a:fillRef>
+          <a:effectRef idx="0">
+            <a:schemeClr val="accent1"/>
+          </a:effectRef>
+          <a:fontRef idx="minor">
+            <a:schemeClr val="lt1"/>
+          </a:fontRef>
+        </p:style>
+        <p:txBody>
+          <a:bodyPr rtlCol="0" anchor="ctr"/>
+          <a:lstStyle/>
+          <a:p>
+            <a:pPr algn="ctr"/>
+            <a:r>
+              <a:rPr lang="en-US" altLang="zh-TW" dirty="0" smtClean="0"/>
+              <a:t>Pictures</a:t>
+            </a:r>
+            <a:endParaRPr lang="zh-TW" altLang="en-US" dirty="0"/>
+          </a:p>
+        </p:txBody>
+      </p:sp>
+      <p:sp>
+        <p:nvSpPr>
+          <p:cNvPr id="7" name="橢圓 6"/>
+          <p:cNvSpPr/>
+          <p:nvPr/>
+        </p:nvSpPr>
+        <p:spPr>
+          <a:xfrm>
+            <a:off x="3995936" y="5373216"/>
+            <a:ext cx="144016" cy="144016"/>
+          </a:xfrm>
+          <a:prstGeom prst="ellipse">
+            <a:avLst/>
+          </a:prstGeom>
+        </p:spPr>
+        <p:style>
+          <a:lnRef idx="2">
+            <a:schemeClr val="dk1">
+              <a:shade val="50000"/>
+            </a:schemeClr>
+          </a:lnRef>
+          <a:fillRef idx="1">
+            <a:schemeClr val="dk1"/>
+          </a:fillRef>
+          <a:effectRef idx="0">
+            <a:schemeClr val="dk1"/>
+          </a:effectRef>
+          <a:fontRef idx="minor">
+            <a:schemeClr val="lt1"/>
+          </a:fontRef>
+        </p:style>
+        <p:txBody>
+          <a:bodyPr rtlCol="0" anchor="ctr"/>
+          <a:lstStyle/>
+          <a:p>
+            <a:pPr algn="ctr"/>
+            <a:endParaRPr lang="zh-TW" altLang="en-US"/>
+          </a:p>
+        </p:txBody>
+      </p:sp>
+      <p:sp>
+        <p:nvSpPr>
+          <p:cNvPr id="8" name="橢圓 7"/>
+          <p:cNvSpPr/>
+          <p:nvPr/>
+        </p:nvSpPr>
+        <p:spPr>
+          <a:xfrm>
+            <a:off x="4211960" y="5373216"/>
+            <a:ext cx="144016" cy="144016"/>
+          </a:xfrm>
+          <a:prstGeom prst="ellipse">
+            <a:avLst/>
+          </a:prstGeom>
+        </p:spPr>
+        <p:style>
+          <a:lnRef idx="2">
+            <a:schemeClr val="dk1"/>
+          </a:lnRef>
+          <a:fillRef idx="1">
+            <a:schemeClr val="lt1"/>
+          </a:fillRef>
+          <a:effectRef idx="0">
+            <a:schemeClr val="dk1"/>
+          </a:effectRef>
+          <a:fontRef idx="minor">
+            <a:schemeClr val="dk1"/>
+          </a:fontRef>
+        </p:style>
+        <p:txBody>
+          <a:bodyPr rtlCol="0" anchor="ctr"/>
+          <a:lstStyle/>
+          <a:p>
+            <a:pPr algn="ctr"/>
+            <a:endParaRPr lang="zh-TW" altLang="en-US"/>
+          </a:p>
+        </p:txBody>
+      </p:sp>
+      <p:sp>
+        <p:nvSpPr>
+          <p:cNvPr id="9" name="橢圓 8"/>
+          <p:cNvSpPr/>
+          <p:nvPr/>
+        </p:nvSpPr>
+        <p:spPr>
+          <a:xfrm>
+            <a:off x="4427984" y="5373216"/>
+            <a:ext cx="144016" cy="144016"/>
+          </a:xfrm>
+          <a:prstGeom prst="ellipse">
+            <a:avLst/>
+          </a:prstGeom>
+        </p:spPr>
+        <p:style>
+          <a:lnRef idx="2">
+            <a:schemeClr val="dk1"/>
+          </a:lnRef>
+          <a:fillRef idx="1">
+            <a:schemeClr val="lt1"/>
+          </a:fillRef>
+          <a:effectRef idx="0">
+            <a:schemeClr val="dk1"/>
+          </a:effectRef>
+          <a:fontRef idx="minor">
+            <a:schemeClr val="dk1"/>
+          </a:fontRef>
+        </p:style>
+        <p:txBody>
+          <a:bodyPr rtlCol="0" anchor="ctr"/>
+          <a:lstStyle/>
+          <a:p>
+            <a:pPr algn="ctr"/>
+            <a:endParaRPr lang="zh-TW" altLang="en-US"/>
+          </a:p>
+        </p:txBody>
+      </p:sp>
+      <p:sp>
+        <p:nvSpPr>
+          <p:cNvPr id="10" name="橢圓 9"/>
+          <p:cNvSpPr/>
+          <p:nvPr/>
+        </p:nvSpPr>
+        <p:spPr>
+          <a:xfrm>
+            <a:off x="4644008" y="5373216"/>
+            <a:ext cx="144016" cy="144016"/>
+          </a:xfrm>
+          <a:prstGeom prst="ellipse">
+            <a:avLst/>
+          </a:prstGeom>
+        </p:spPr>
+        <p:style>
+          <a:lnRef idx="2">
+            <a:schemeClr val="dk1"/>
+          </a:lnRef>
+          <a:fillRef idx="1">
+            <a:schemeClr val="lt1"/>
+          </a:fillRef>
+          <a:effectRef idx="0">
+            <a:schemeClr val="dk1"/>
+          </a:effectRef>
+          <a:fontRef idx="minor">
+            <a:schemeClr val="dk1"/>
+          </a:fontRef>
+        </p:style>
+        <p:txBody>
+          <a:bodyPr rtlCol="0" anchor="ctr"/>
+          <a:lstStyle/>
+          <a:p>
+            <a:pPr algn="ctr"/>
+            <a:endParaRPr lang="zh-TW" altLang="en-US"/>
+          </a:p>
+        </p:txBody>
+      </p:sp>
+      <p:sp>
+        <p:nvSpPr>
+          <p:cNvPr id="11" name="橢圓 10"/>
+          <p:cNvSpPr/>
+          <p:nvPr/>
+        </p:nvSpPr>
+        <p:spPr>
+          <a:xfrm>
+            <a:off x="4860032" y="5373216"/>
+            <a:ext cx="144016" cy="144016"/>
+          </a:xfrm>
+          <a:prstGeom prst="ellipse">
+            <a:avLst/>
+          </a:prstGeom>
+        </p:spPr>
+        <p:style>
+          <a:lnRef idx="2">
+            <a:schemeClr val="dk1"/>
+          </a:lnRef>
+          <a:fillRef idx="1">
+            <a:schemeClr val="lt1"/>
+          </a:fillRef>
+          <a:effectRef idx="0">
+            <a:schemeClr val="dk1"/>
+          </a:effectRef>
+          <a:fontRef idx="minor">
+            <a:schemeClr val="dk1"/>
+          </a:fontRef>
+        </p:style>
+        <p:txBody>
+          <a:bodyPr rtlCol="0" anchor="ctr"/>
+          <a:lstStyle/>
+          <a:p>
+            <a:pPr algn="ctr"/>
+            <a:endParaRPr lang="zh-TW" altLang="en-US"/>
+          </a:p>
+        </p:txBody>
+      </p:sp>
+      <p:sp>
+        <p:nvSpPr>
+          <p:cNvPr id="13" name="雲朵形圖說文字 12"/>
+          <p:cNvSpPr/>
+          <p:nvPr/>
+        </p:nvSpPr>
+        <p:spPr>
+          <a:xfrm>
+            <a:off x="5928931" y="237883"/>
+            <a:ext cx="3203848" cy="2448272"/>
+          </a:xfrm>
+          <a:prstGeom prst="cloudCallout">
+            <a:avLst>
+              <a:gd name="adj1" fmla="val -73311"/>
+              <a:gd name="adj2" fmla="val 52862"/>
+            </a:avLst>
+          </a:prstGeom>
+        </p:spPr>
+        <p:style>
+          <a:lnRef idx="2">
+            <a:schemeClr val="accent2"/>
+          </a:lnRef>
+          <a:fillRef idx="1">
+            <a:schemeClr val="lt1"/>
+          </a:fillRef>
+          <a:effectRef idx="0">
+            <a:schemeClr val="accent2"/>
+          </a:effectRef>
+          <a:fontRef idx="minor">
+            <a:schemeClr val="dk1"/>
+          </a:fontRef>
+        </p:style>
+        <p:txBody>
+          <a:bodyPr rtlCol="0" anchor="ctr"/>
+          <a:lstStyle/>
+          <a:p>
+            <a:r>
+              <a:rPr lang="en-US" altLang="zh-TW" dirty="0"/>
+              <a:t>Welcome pages and using pictures to tell user what our product can help.</a:t>
+            </a:r>
+            <a:endParaRPr lang="zh-TW" altLang="en-US" dirty="0"/>
+          </a:p>
+        </p:txBody>
+      </p:sp>
+      <p:sp>
+        <p:nvSpPr>
+          <p:cNvPr id="15" name="文字方塊 14"/>
+          <p:cNvSpPr txBox="1"/>
+          <p:nvPr/>
+        </p:nvSpPr>
+        <p:spPr>
+          <a:xfrm>
+            <a:off x="95283" y="159023"/>
+            <a:ext cx="2057615" cy="461665"/>
+          </a:xfrm>
+          <a:prstGeom prst="rect">
+            <a:avLst/>
+          </a:prstGeom>
+          <a:noFill/>
+        </p:spPr>
+        <p:txBody>
+          <a:bodyPr wrap="none" rtlCol="0">
+            <a:spAutoFit/>
+          </a:bodyPr>
+          <a:lstStyle/>
+          <a:p>
+            <a:r>
+              <a:rPr lang="en-US" altLang="zh-TW" sz="2400" b="1" dirty="0" smtClean="0">
+                <a:solidFill>
+                  <a:srgbClr val="FF0000"/>
+                </a:solidFill>
+              </a:rPr>
+              <a:t>Welcome Page</a:t>
+            </a:r>
+            <a:endParaRPr lang="zh-TW" altLang="en-US" sz="2400" b="1" dirty="0">
+              <a:solidFill>
+                <a:srgbClr val="FF0000"/>
+              </a:solidFill>
+            </a:endParaRPr>
+          </a:p>
+        </p:txBody>
+      </p:sp>
+    </p:spTree>
+    <p:extLst>
+      <p:ext uri="{BB962C8B-B14F-4D97-AF65-F5344CB8AC3E}">
+        <p14:creationId xmlns:p14="http://schemas.microsoft.com/office/powerpoint/2010/main" val="792087542"/>
+      </p:ext>
+    </p:extLst>
+  </p:cSld>
+  <p:clrMapOvr>
+    <a:masterClrMapping/>
+  </p:clrMapOvr>
+</p:sld>
+</file>
+
+<file path=ppt/slides/slide4.xml><?xml version="1.0" encoding="utf-8"?>
+<p:sld xmlns:a="http://schemas.openxmlformats.org/drawingml/2006/main" xmlns:r="http://schemas.openxmlformats.org/officeDocument/2006/relationships" xmlns:p="http://schemas.openxmlformats.org/presentationml/2006/main">
+  <p:cSld>
+    <p:spTree>
+      <p:nvGrpSpPr>
+        <p:cNvPr id="1" name=""/>
+        <p:cNvGrpSpPr/>
+        <p:nvPr/>
+      </p:nvGrpSpPr>
+      <p:grpSpPr>
+        <a:xfrm>
+          <a:off x="0" y="0"/>
+          <a:ext cx="0" cy="0"/>
+          <a:chOff x="0" y="0"/>
+          <a:chExt cx="0" cy="0"/>
+        </a:xfrm>
+      </p:grpSpPr>
+      <p:sp>
+        <p:nvSpPr>
+          <p:cNvPr id="4" name="圓角矩形 3"/>
+          <p:cNvSpPr/>
+          <p:nvPr/>
+        </p:nvSpPr>
+        <p:spPr>
+          <a:xfrm>
+            <a:off x="2137990" y="116632"/>
+            <a:ext cx="4824536" cy="6624736"/>
+          </a:xfrm>
+          <a:prstGeom prst="roundRect">
+            <a:avLst/>
+          </a:prstGeom>
+        </p:spPr>
+        <p:style>
+          <a:lnRef idx="2">
+            <a:schemeClr val="accent1"/>
+          </a:lnRef>
+          <a:fillRef idx="1">
+            <a:schemeClr val="lt1"/>
+          </a:fillRef>
+          <a:effectRef idx="0">
+            <a:schemeClr val="accent1"/>
+          </a:effectRef>
+          <a:fontRef idx="minor">
+            <a:schemeClr val="dk1"/>
+          </a:fontRef>
+        </p:style>
+        <p:txBody>
+          <a:bodyPr rtlCol="0" anchor="ctr"/>
+          <a:lstStyle/>
+          <a:p>
+            <a:pPr algn="ctr"/>
+            <a:endParaRPr lang="zh-TW" altLang="en-US"/>
+          </a:p>
+        </p:txBody>
+      </p:sp>
+      <p:sp>
+        <p:nvSpPr>
+          <p:cNvPr id="5" name="矩形 4"/>
+          <p:cNvSpPr/>
+          <p:nvPr/>
+        </p:nvSpPr>
+        <p:spPr>
+          <a:xfrm>
+            <a:off x="2555776" y="620688"/>
+            <a:ext cx="4032448" cy="4464496"/>
+          </a:xfrm>
+          <a:prstGeom prst="rect">
+            <a:avLst/>
+          </a:prstGeom>
+        </p:spPr>
+        <p:style>
+          <a:lnRef idx="2">
+            <a:schemeClr val="accent1">
+              <a:shade val="50000"/>
+            </a:schemeClr>
+          </a:lnRef>
+          <a:fillRef idx="1">
+            <a:schemeClr val="accent1"/>
+          </a:fillRef>
+          <a:effectRef idx="0">
+            <a:schemeClr val="accent1"/>
+          </a:effectRef>
+          <a:fontRef idx="minor">
+            <a:schemeClr val="lt1"/>
+          </a:fontRef>
+        </p:style>
+        <p:txBody>
+          <a:bodyPr rtlCol="0" anchor="ctr"/>
+          <a:lstStyle/>
+          <a:p>
+            <a:pPr algn="ctr"/>
+            <a:r>
+              <a:rPr lang="en-US" altLang="zh-TW" dirty="0" smtClean="0"/>
+              <a:t>Welcome</a:t>
+            </a:r>
+            <a:endParaRPr lang="zh-TW" altLang="en-US" dirty="0"/>
+          </a:p>
+        </p:txBody>
+      </p:sp>
+      <p:sp>
+        <p:nvSpPr>
+          <p:cNvPr id="8" name="橢圓 7"/>
+          <p:cNvSpPr/>
+          <p:nvPr/>
+        </p:nvSpPr>
+        <p:spPr>
+          <a:xfrm>
+            <a:off x="4211960" y="5373216"/>
+            <a:ext cx="144016" cy="144016"/>
+          </a:xfrm>
+          <a:prstGeom prst="ellipse">
+            <a:avLst/>
+          </a:prstGeom>
+        </p:spPr>
+        <p:style>
+          <a:lnRef idx="2">
+            <a:schemeClr val="dk1"/>
+          </a:lnRef>
+          <a:fillRef idx="1">
+            <a:schemeClr val="lt1"/>
+          </a:fillRef>
+          <a:effectRef idx="0">
+            <a:schemeClr val="dk1"/>
+          </a:effectRef>
+          <a:fontRef idx="minor">
+            <a:schemeClr val="dk1"/>
+          </a:fontRef>
+        </p:style>
+        <p:txBody>
+          <a:bodyPr rtlCol="0" anchor="ctr"/>
+          <a:lstStyle/>
+          <a:p>
+            <a:pPr algn="ctr"/>
+            <a:endParaRPr lang="zh-TW" altLang="en-US"/>
+          </a:p>
+        </p:txBody>
+      </p:sp>
+      <p:sp>
+        <p:nvSpPr>
+          <p:cNvPr id="9" name="橢圓 8"/>
+          <p:cNvSpPr/>
+          <p:nvPr/>
+        </p:nvSpPr>
+        <p:spPr>
+          <a:xfrm>
+            <a:off x="4427984" y="5373216"/>
+            <a:ext cx="144016" cy="144016"/>
+          </a:xfrm>
+          <a:prstGeom prst="ellipse">
+            <a:avLst/>
+          </a:prstGeom>
+        </p:spPr>
+        <p:style>
+          <a:lnRef idx="2">
+            <a:schemeClr val="dk1"/>
+          </a:lnRef>
+          <a:fillRef idx="1">
+            <a:schemeClr val="lt1"/>
+          </a:fillRef>
+          <a:effectRef idx="0">
+            <a:schemeClr val="dk1"/>
+          </a:effectRef>
+          <a:fontRef idx="minor">
+            <a:schemeClr val="dk1"/>
+          </a:fontRef>
+        </p:style>
+        <p:txBody>
+          <a:bodyPr rtlCol="0" anchor="ctr"/>
+          <a:lstStyle/>
+          <a:p>
+            <a:pPr algn="ctr"/>
+            <a:endParaRPr lang="zh-TW" altLang="en-US"/>
+          </a:p>
+        </p:txBody>
+      </p:sp>
+      <p:sp>
+        <p:nvSpPr>
+          <p:cNvPr id="10" name="橢圓 9"/>
+          <p:cNvSpPr/>
+          <p:nvPr/>
+        </p:nvSpPr>
+        <p:spPr>
+          <a:xfrm>
+            <a:off x="4644008" y="5373216"/>
+            <a:ext cx="144016" cy="144016"/>
+          </a:xfrm>
+          <a:prstGeom prst="ellipse">
+            <a:avLst/>
+          </a:prstGeom>
+        </p:spPr>
+        <p:style>
+          <a:lnRef idx="2">
+            <a:schemeClr val="dk1"/>
+          </a:lnRef>
+          <a:fillRef idx="1">
+            <a:schemeClr val="lt1"/>
+          </a:fillRef>
+          <a:effectRef idx="0">
+            <a:schemeClr val="dk1"/>
+          </a:effectRef>
+          <a:fontRef idx="minor">
+            <a:schemeClr val="dk1"/>
+          </a:fontRef>
+        </p:style>
+        <p:txBody>
+          <a:bodyPr rtlCol="0" anchor="ctr"/>
+          <a:lstStyle/>
+          <a:p>
+            <a:pPr algn="ctr"/>
+            <a:endParaRPr lang="zh-TW" altLang="en-US"/>
+          </a:p>
+        </p:txBody>
+      </p:sp>
+      <p:sp>
+        <p:nvSpPr>
+          <p:cNvPr id="11" name="橢圓 10"/>
+          <p:cNvSpPr/>
+          <p:nvPr/>
+        </p:nvSpPr>
+        <p:spPr>
+          <a:xfrm>
+            <a:off x="3995936" y="5373216"/>
+            <a:ext cx="144016" cy="144016"/>
+          </a:xfrm>
+          <a:prstGeom prst="ellipse">
+            <a:avLst/>
+          </a:prstGeom>
+        </p:spPr>
+        <p:style>
+          <a:lnRef idx="2">
+            <a:schemeClr val="dk1"/>
+          </a:lnRef>
+          <a:fillRef idx="1">
+            <a:schemeClr val="lt1"/>
+          </a:fillRef>
+          <a:effectRef idx="0">
+            <a:schemeClr val="dk1"/>
+          </a:effectRef>
+          <a:fontRef idx="minor">
+            <a:schemeClr val="dk1"/>
+          </a:fontRef>
+        </p:style>
+        <p:txBody>
+          <a:bodyPr rtlCol="0" anchor="ctr"/>
+          <a:lstStyle/>
+          <a:p>
+            <a:pPr algn="ctr"/>
+            <a:endParaRPr lang="zh-TW" altLang="en-US"/>
+          </a:p>
+        </p:txBody>
+      </p:sp>
+      <p:sp>
+        <p:nvSpPr>
+          <p:cNvPr id="13" name="雲朵形圖說文字 12"/>
+          <p:cNvSpPr/>
+          <p:nvPr/>
+        </p:nvSpPr>
+        <p:spPr>
+          <a:xfrm>
+            <a:off x="5928931" y="237883"/>
+            <a:ext cx="3203848" cy="2448272"/>
+          </a:xfrm>
+          <a:prstGeom prst="cloudCallout">
+            <a:avLst>
+              <a:gd name="adj1" fmla="val -73311"/>
+              <a:gd name="adj2" fmla="val 52862"/>
+            </a:avLst>
+          </a:prstGeom>
+        </p:spPr>
+        <p:style>
+          <a:lnRef idx="2">
+            <a:schemeClr val="accent2"/>
+          </a:lnRef>
+          <a:fillRef idx="1">
+            <a:schemeClr val="lt1"/>
+          </a:fillRef>
+          <a:effectRef idx="0">
+            <a:schemeClr val="accent2"/>
+          </a:effectRef>
+          <a:fontRef idx="minor">
+            <a:schemeClr val="dk1"/>
+          </a:fontRef>
+        </p:style>
+        <p:txBody>
+          <a:bodyPr rtlCol="0" anchor="ctr"/>
+          <a:lstStyle/>
+          <a:p>
+            <a:r>
+              <a:rPr lang="en-US" altLang="zh-TW" dirty="0" smtClean="0"/>
+              <a:t>Slide to last welcome page and one touch will get in main page.</a:t>
+            </a:r>
+            <a:endParaRPr lang="zh-TW" altLang="en-US" dirty="0"/>
+          </a:p>
+        </p:txBody>
+      </p:sp>
+      <p:sp>
+        <p:nvSpPr>
+          <p:cNvPr id="12" name="橢圓 11"/>
+          <p:cNvSpPr/>
+          <p:nvPr/>
+        </p:nvSpPr>
+        <p:spPr>
+          <a:xfrm>
+            <a:off x="4860032" y="5373216"/>
+            <a:ext cx="144016" cy="144016"/>
+          </a:xfrm>
+          <a:prstGeom prst="ellipse">
+            <a:avLst/>
+          </a:prstGeom>
+        </p:spPr>
+        <p:style>
+          <a:lnRef idx="2">
+            <a:schemeClr val="dk1">
+              <a:shade val="50000"/>
+            </a:schemeClr>
+          </a:lnRef>
+          <a:fillRef idx="1">
+            <a:schemeClr val="dk1"/>
+          </a:fillRef>
+          <a:effectRef idx="0">
+            <a:schemeClr val="dk1"/>
+          </a:effectRef>
+          <a:fontRef idx="minor">
+            <a:schemeClr val="lt1"/>
+          </a:fontRef>
+        </p:style>
+        <p:txBody>
+          <a:bodyPr rtlCol="0" anchor="ctr"/>
+          <a:lstStyle/>
+          <a:p>
+            <a:pPr algn="ctr"/>
+            <a:endParaRPr lang="zh-TW" altLang="en-US"/>
+          </a:p>
+        </p:txBody>
+      </p:sp>
+      <p:sp>
+        <p:nvSpPr>
+          <p:cNvPr id="14" name="文字方塊 13"/>
+          <p:cNvSpPr txBox="1"/>
+          <p:nvPr/>
+        </p:nvSpPr>
+        <p:spPr>
+          <a:xfrm>
+            <a:off x="95283" y="159023"/>
+            <a:ext cx="2057615" cy="461665"/>
+          </a:xfrm>
+          <a:prstGeom prst="rect">
+            <a:avLst/>
+          </a:prstGeom>
+          <a:noFill/>
+        </p:spPr>
+        <p:txBody>
+          <a:bodyPr wrap="none" rtlCol="0">
+            <a:spAutoFit/>
+          </a:bodyPr>
+          <a:lstStyle/>
+          <a:p>
+            <a:r>
+              <a:rPr lang="en-US" altLang="zh-TW" sz="2400" b="1" dirty="0" smtClean="0">
+                <a:solidFill>
+                  <a:srgbClr val="FF0000"/>
+                </a:solidFill>
+              </a:rPr>
+              <a:t>Welcome Page</a:t>
+            </a:r>
+            <a:endParaRPr lang="zh-TW" altLang="en-US" sz="2400" b="1" dirty="0">
+              <a:solidFill>
+                <a:srgbClr val="FF0000"/>
+              </a:solidFill>
+            </a:endParaRPr>
+          </a:p>
+        </p:txBody>
+      </p:sp>
+    </p:spTree>
+    <p:extLst>
+      <p:ext uri="{BB962C8B-B14F-4D97-AF65-F5344CB8AC3E}">
+        <p14:creationId xmlns:p14="http://schemas.microsoft.com/office/powerpoint/2010/main" val="822975590"/>
+      </p:ext>
+    </p:extLst>
+  </p:cSld>
+  <p:clrMapOvr>
+    <a:masterClrMapping/>
+  </p:clrMapOvr>
+</p:sld>
+</file>
+
+<file path=ppt/slides/slide5.xml><?xml version="1.0" encoding="utf-8"?>
+<p:sld xmlns:a="http://schemas.openxmlformats.org/drawingml/2006/main" xmlns:r="http://schemas.openxmlformats.org/officeDocument/2006/relationships" xmlns:p="http://schemas.openxmlformats.org/presentationml/2006/main">
+  <p:cSld>
+    <p:spTree>
+      <p:nvGrpSpPr>
+        <p:cNvPr id="1" name=""/>
+        <p:cNvGrpSpPr/>
+        <p:nvPr/>
+      </p:nvGrpSpPr>
+      <p:grpSpPr>
+        <a:xfrm>
+          <a:off x="0" y="0"/>
+          <a:ext cx="0" cy="0"/>
+          <a:chOff x="0" y="0"/>
+          <a:chExt cx="0" cy="0"/>
+        </a:xfrm>
+      </p:grpSpPr>
+      <p:sp>
+        <p:nvSpPr>
+          <p:cNvPr id="4" name="圓角矩形 3"/>
+          <p:cNvSpPr/>
+          <p:nvPr/>
+        </p:nvSpPr>
+        <p:spPr>
+          <a:xfrm>
+            <a:off x="2137990" y="116632"/>
+            <a:ext cx="4824536" cy="6624736"/>
+          </a:xfrm>
+          <a:prstGeom prst="roundRect">
+            <a:avLst/>
+          </a:prstGeom>
+        </p:spPr>
+        <p:style>
+          <a:lnRef idx="2">
+            <a:schemeClr val="accent1"/>
+          </a:lnRef>
+          <a:fillRef idx="1">
+            <a:schemeClr val="lt1"/>
+          </a:fillRef>
+          <a:effectRef idx="0">
+            <a:schemeClr val="accent1"/>
+          </a:effectRef>
+          <a:fontRef idx="minor">
+            <a:schemeClr val="dk1"/>
+          </a:fontRef>
+        </p:style>
+        <p:txBody>
+          <a:bodyPr rtlCol="0" anchor="ctr"/>
+          <a:lstStyle/>
+          <a:p>
+            <a:pPr algn="ctr"/>
+            <a:endParaRPr lang="zh-TW" altLang="en-US"/>
+          </a:p>
+        </p:txBody>
+      </p:sp>
+      <p:sp>
+        <p:nvSpPr>
+          <p:cNvPr id="13" name="雲朵形圖說文字 12"/>
+          <p:cNvSpPr/>
+          <p:nvPr/>
+        </p:nvSpPr>
+        <p:spPr>
+          <a:xfrm>
+            <a:off x="5773241" y="1645394"/>
+            <a:ext cx="3024336" cy="1783606"/>
+          </a:xfrm>
+          <a:prstGeom prst="cloudCallout">
+            <a:avLst>
+              <a:gd name="adj1" fmla="val -22826"/>
+              <a:gd name="adj2" fmla="val -72838"/>
+            </a:avLst>
+          </a:prstGeom>
+        </p:spPr>
+        <p:style>
+          <a:lnRef idx="2">
+            <a:schemeClr val="accent2"/>
+          </a:lnRef>
+          <a:fillRef idx="1">
+            <a:schemeClr val="lt1"/>
+          </a:fillRef>
+          <a:effectRef idx="0">
+            <a:schemeClr val="accent2"/>
+          </a:effectRef>
+          <a:fontRef idx="minor">
+            <a:schemeClr val="dk1"/>
+          </a:fontRef>
+        </p:style>
+        <p:txBody>
+          <a:bodyPr rtlCol="0" anchor="ctr"/>
+          <a:lstStyle/>
+          <a:p>
+            <a:r>
+              <a:rPr lang="en-US" altLang="zh-TW" dirty="0" smtClean="0"/>
+              <a:t>Touch setting </a:t>
+            </a:r>
+            <a:r>
+              <a:rPr lang="en-US" altLang="zh-TW" dirty="0" err="1" smtClean="0"/>
+              <a:t>ico</a:t>
+            </a:r>
+            <a:r>
+              <a:rPr lang="en-US" altLang="zh-TW" dirty="0" smtClean="0"/>
+              <a:t> can set user’s configurations.</a:t>
+            </a:r>
+            <a:endParaRPr lang="zh-TW" altLang="en-US" dirty="0"/>
+          </a:p>
+        </p:txBody>
+      </p:sp>
+      <p:pic>
+        <p:nvPicPr>
+          <p:cNvPr id="1026" name="Picture 2" descr="http://icons.iconarchive.com/icons/cornmanthe3rd/plex/512/System-settings-icon.png"/>
+          <p:cNvPicPr>
+            <a:picLocks noChangeAspect="1" noChangeArrowheads="1"/>
+          </p:cNvPicPr>
+          <p:nvPr/>
+        </p:nvPicPr>
+        <p:blipFill>
+          <a:blip r:embed="rId2" cstate="print">
+            <a:extLst>
+              <a:ext uri="{28A0092B-C50C-407E-A947-70E740481C1C}">
+                <a14:useLocalDpi xmlns:a14="http://schemas.microsoft.com/office/drawing/2010/main" val="0"/>
+              </a:ext>
+            </a:extLst>
+          </a:blip>
+          <a:srcRect/>
+          <a:stretch>
+            <a:fillRect/>
+          </a:stretch>
+        </p:blipFill>
+        <p:spPr bwMode="auto">
+          <a:xfrm>
+            <a:off x="5724128" y="162034"/>
+            <a:ext cx="1008112" cy="1008112"/>
+          </a:xfrm>
+          <a:prstGeom prst="rect">
+            <a:avLst/>
+          </a:prstGeom>
+          <a:noFill/>
+          <a:extLst>
+            <a:ext uri="{909E8E84-426E-40DD-AFC4-6F175D3DCCD1}">
+              <a14:hiddenFill xmlns:a14="http://schemas.microsoft.com/office/drawing/2010/main">
+                <a:solidFill>
+                  <a:srgbClr val="FFFFFF"/>
+                </a:solidFill>
+              </a14:hiddenFill>
+            </a:ext>
+          </a:extLst>
+        </p:spPr>
+      </p:pic>
+      <p:pic>
+        <p:nvPicPr>
+          <p:cNvPr id="1028" name="Picture 4" descr="http://icons.iconarchive.com/icons/cornmanthe3rd/plex/128/System-documents-icon.png"/>
+          <p:cNvPicPr>
+            <a:picLocks noChangeAspect="1" noChangeArrowheads="1"/>
+          </p:cNvPicPr>
+          <p:nvPr/>
+        </p:nvPicPr>
+        <p:blipFill>
+          <a:blip r:embed="rId3">
+            <a:extLst>
+              <a:ext uri="{28A0092B-C50C-407E-A947-70E740481C1C}">
+                <a14:useLocalDpi xmlns:a14="http://schemas.microsoft.com/office/drawing/2010/main" val="0"/>
+              </a:ext>
+            </a:extLst>
+          </a:blip>
+          <a:srcRect/>
+          <a:stretch>
+            <a:fillRect/>
+          </a:stretch>
+        </p:blipFill>
+        <p:spPr bwMode="auto">
+          <a:xfrm>
+            <a:off x="3635896" y="271657"/>
+            <a:ext cx="788863" cy="788864"/>
+          </a:xfrm>
+          <a:prstGeom prst="rect">
+            <a:avLst/>
+          </a:prstGeom>
+          <a:noFill/>
+          <a:extLst>
+            <a:ext uri="{909E8E84-426E-40DD-AFC4-6F175D3DCCD1}">
+              <a14:hiddenFill xmlns:a14="http://schemas.microsoft.com/office/drawing/2010/main">
+                <a:solidFill>
+                  <a:srgbClr val="FFFFFF"/>
+                </a:solidFill>
+              </a14:hiddenFill>
+            </a:ext>
+          </a:extLst>
+        </p:spPr>
+      </p:pic>
+      <p:pic>
+        <p:nvPicPr>
+          <p:cNvPr id="1030" name="Picture 6" descr="http://icons.iconarchive.com/icons/cornmanthe3rd/plex/128/Utilities-tasks-icon.png"/>
+          <p:cNvPicPr>
+            <a:picLocks noChangeAspect="1" noChangeArrowheads="1"/>
+          </p:cNvPicPr>
+          <p:nvPr/>
+        </p:nvPicPr>
+        <p:blipFill>
+          <a:blip r:embed="rId4">
+            <a:extLst>
+              <a:ext uri="{28A0092B-C50C-407E-A947-70E740481C1C}">
+                <a14:useLocalDpi xmlns:a14="http://schemas.microsoft.com/office/drawing/2010/main" val="0"/>
+              </a:ext>
+            </a:extLst>
+          </a:blip>
+          <a:srcRect/>
+          <a:stretch>
+            <a:fillRect/>
+          </a:stretch>
+        </p:blipFill>
+        <p:spPr bwMode="auto">
+          <a:xfrm>
+            <a:off x="2483768" y="224477"/>
+            <a:ext cx="891802" cy="891803"/>
+          </a:xfrm>
+          <a:prstGeom prst="rect">
+            <a:avLst/>
+          </a:prstGeom>
+          <a:noFill/>
+          <a:extLst>
+            <a:ext uri="{909E8E84-426E-40DD-AFC4-6F175D3DCCD1}">
+              <a14:hiddenFill xmlns:a14="http://schemas.microsoft.com/office/drawing/2010/main">
+                <a:solidFill>
+                  <a:srgbClr val="FFFFFF"/>
+                </a:solidFill>
+              </a14:hiddenFill>
+            </a:ext>
+          </a:extLst>
+        </p:spPr>
+      </p:pic>
+      <p:sp>
+        <p:nvSpPr>
+          <p:cNvPr id="16" name="雲朵形圖說文字 15"/>
+          <p:cNvSpPr/>
+          <p:nvPr/>
+        </p:nvSpPr>
+        <p:spPr>
+          <a:xfrm>
+            <a:off x="210419" y="2033141"/>
+            <a:ext cx="3024336" cy="1783606"/>
+          </a:xfrm>
+          <a:prstGeom prst="cloudCallout">
+            <a:avLst>
+              <a:gd name="adj1" fmla="val 36700"/>
+              <a:gd name="adj2" fmla="val -97672"/>
+            </a:avLst>
+          </a:prstGeom>
+        </p:spPr>
+        <p:style>
+          <a:lnRef idx="2">
+            <a:schemeClr val="accent2"/>
+          </a:lnRef>
+          <a:fillRef idx="1">
+            <a:schemeClr val="lt1"/>
+          </a:fillRef>
+          <a:effectRef idx="0">
+            <a:schemeClr val="accent2"/>
+          </a:effectRef>
+          <a:fontRef idx="minor">
+            <a:schemeClr val="dk1"/>
+          </a:fontRef>
+        </p:style>
+        <p:txBody>
+          <a:bodyPr rtlCol="0" anchor="ctr"/>
+          <a:lstStyle/>
+          <a:p>
+            <a:r>
+              <a:rPr lang="en-US" altLang="zh-TW" dirty="0" smtClean="0"/>
+              <a:t>Schedule user’s plan. The first view when user way in.</a:t>
+            </a:r>
+            <a:endParaRPr lang="zh-TW" altLang="en-US" dirty="0"/>
+          </a:p>
+        </p:txBody>
+      </p:sp>
+      <p:pic>
+        <p:nvPicPr>
+          <p:cNvPr id="1032" name="Picture 8" descr="http://icons.iconarchive.com/icons/xenatt/the-circle/128/App-Messages-icon.png"/>
+          <p:cNvPicPr>
+            <a:picLocks noChangeAspect="1" noChangeArrowheads="1"/>
+          </p:cNvPicPr>
+          <p:nvPr/>
+        </p:nvPicPr>
+        <p:blipFill>
+          <a:blip r:embed="rId5">
+            <a:extLst>
+              <a:ext uri="{28A0092B-C50C-407E-A947-70E740481C1C}">
+                <a14:useLocalDpi xmlns:a14="http://schemas.microsoft.com/office/drawing/2010/main" val="0"/>
+              </a:ext>
+            </a:extLst>
+          </a:blip>
+          <a:srcRect/>
+          <a:stretch>
+            <a:fillRect/>
+          </a:stretch>
+        </p:blipFill>
+        <p:spPr bwMode="auto">
+          <a:xfrm>
+            <a:off x="4716016" y="215899"/>
+            <a:ext cx="900380" cy="900381"/>
+          </a:xfrm>
+          <a:prstGeom prst="rect">
+            <a:avLst/>
+          </a:prstGeom>
+          <a:noFill/>
+          <a:extLst>
+            <a:ext uri="{909E8E84-426E-40DD-AFC4-6F175D3DCCD1}">
+              <a14:hiddenFill xmlns:a14="http://schemas.microsoft.com/office/drawing/2010/main">
+                <a:solidFill>
+                  <a:srgbClr val="FFFFFF"/>
+                </a:solidFill>
+              </a14:hiddenFill>
+            </a:ext>
+          </a:extLst>
+        </p:spPr>
+      </p:pic>
+      <p:sp>
+        <p:nvSpPr>
+          <p:cNvPr id="14" name="雲朵形圖說文字 13"/>
+          <p:cNvSpPr/>
+          <p:nvPr/>
+        </p:nvSpPr>
+        <p:spPr>
+          <a:xfrm>
+            <a:off x="2121420" y="2924944"/>
+            <a:ext cx="3024336" cy="1783606"/>
+          </a:xfrm>
+          <a:prstGeom prst="cloudCallout">
+            <a:avLst>
+              <a:gd name="adj1" fmla="val 12135"/>
+              <a:gd name="adj2" fmla="val -141730"/>
+            </a:avLst>
+          </a:prstGeom>
+        </p:spPr>
+        <p:style>
+          <a:lnRef idx="2">
+            <a:schemeClr val="accent2"/>
+          </a:lnRef>
+          <a:fillRef idx="1">
+            <a:schemeClr val="lt1"/>
+          </a:fillRef>
+          <a:effectRef idx="0">
+            <a:schemeClr val="accent2"/>
+          </a:effectRef>
+          <a:fontRef idx="minor">
+            <a:schemeClr val="dk1"/>
+          </a:fontRef>
+        </p:style>
+        <p:txBody>
+          <a:bodyPr rtlCol="0" anchor="ctr"/>
+          <a:lstStyle/>
+          <a:p>
+            <a:r>
+              <a:rPr lang="en-US" altLang="zh-TW" dirty="0" smtClean="0"/>
+              <a:t>Touch storage </a:t>
+            </a:r>
+            <a:r>
+              <a:rPr lang="en-US" altLang="zh-TW" dirty="0" err="1" smtClean="0"/>
+              <a:t>ico</a:t>
+            </a:r>
+            <a:r>
+              <a:rPr lang="en-US" altLang="zh-TW" dirty="0" smtClean="0"/>
+              <a:t> will see user’s stored plans.</a:t>
+            </a:r>
+            <a:endParaRPr lang="zh-TW" altLang="en-US" dirty="0"/>
+          </a:p>
+        </p:txBody>
+      </p:sp>
+      <p:sp>
+        <p:nvSpPr>
+          <p:cNvPr id="18" name="雲朵形圖說文字 17"/>
+          <p:cNvSpPr/>
+          <p:nvPr/>
+        </p:nvSpPr>
+        <p:spPr>
+          <a:xfrm>
+            <a:off x="4384724" y="3081784"/>
+            <a:ext cx="3024336" cy="1783606"/>
+          </a:xfrm>
+          <a:prstGeom prst="cloudCallout">
+            <a:avLst>
+              <a:gd name="adj1" fmla="val -21408"/>
+              <a:gd name="adj2" fmla="val -140929"/>
+            </a:avLst>
+          </a:prstGeom>
+        </p:spPr>
+        <p:style>
+          <a:lnRef idx="2">
+            <a:schemeClr val="accent2"/>
+          </a:lnRef>
+          <a:fillRef idx="1">
+            <a:schemeClr val="lt1"/>
+          </a:fillRef>
+          <a:effectRef idx="0">
+            <a:schemeClr val="accent2"/>
+          </a:effectRef>
+          <a:fontRef idx="minor">
+            <a:schemeClr val="dk1"/>
+          </a:fontRef>
+        </p:style>
+        <p:txBody>
+          <a:bodyPr rtlCol="0" anchor="ctr"/>
+          <a:lstStyle/>
+          <a:p>
+            <a:r>
+              <a:rPr lang="en-US" altLang="zh-TW" dirty="0" smtClean="0"/>
+              <a:t>Put news to user.</a:t>
+            </a:r>
+            <a:endParaRPr lang="zh-TW" altLang="en-US" dirty="0"/>
+          </a:p>
+        </p:txBody>
+      </p:sp>
+      <p:sp>
+        <p:nvSpPr>
+          <p:cNvPr id="7" name="矩形 6"/>
+          <p:cNvSpPr/>
+          <p:nvPr/>
+        </p:nvSpPr>
+        <p:spPr>
+          <a:xfrm>
+            <a:off x="268594" y="620688"/>
+            <a:ext cx="1135054" cy="461665"/>
+          </a:xfrm>
+          <a:prstGeom prst="rect">
+            <a:avLst/>
+          </a:prstGeom>
+        </p:spPr>
+        <p:txBody>
+          <a:bodyPr wrap="none">
+            <a:spAutoFit/>
+          </a:bodyPr>
+          <a:lstStyle/>
+          <a:p>
+            <a:pPr lvl="0"/>
+            <a:r>
+              <a:rPr lang="en-US" altLang="zh-TW" sz="2400" b="1" dirty="0">
+                <a:solidFill>
+                  <a:srgbClr val="FF0000"/>
+                </a:solidFill>
+              </a:rPr>
+              <a:t>4 views</a:t>
+            </a:r>
+            <a:endParaRPr lang="zh-TW" altLang="en-US" sz="2400" b="1" dirty="0">
+              <a:solidFill>
+                <a:srgbClr val="FF0000"/>
+              </a:solidFill>
+            </a:endParaRPr>
+          </a:p>
+        </p:txBody>
+      </p:sp>
+      <p:sp>
+        <p:nvSpPr>
+          <p:cNvPr id="21" name="文字方塊 20"/>
+          <p:cNvSpPr txBox="1"/>
+          <p:nvPr/>
+        </p:nvSpPr>
+        <p:spPr>
+          <a:xfrm>
+            <a:off x="95283" y="159023"/>
+            <a:ext cx="1523430" cy="461665"/>
+          </a:xfrm>
+          <a:prstGeom prst="rect">
+            <a:avLst/>
+          </a:prstGeom>
+          <a:noFill/>
+        </p:spPr>
+        <p:txBody>
+          <a:bodyPr wrap="none" rtlCol="0">
+            <a:spAutoFit/>
+          </a:bodyPr>
+          <a:lstStyle/>
+          <a:p>
+            <a:r>
+              <a:rPr lang="en-US" altLang="zh-TW" sz="2400" b="1" dirty="0" smtClean="0">
+                <a:solidFill>
+                  <a:srgbClr val="FF0000"/>
+                </a:solidFill>
+              </a:rPr>
+              <a:t>Main Page</a:t>
+            </a:r>
+            <a:endParaRPr lang="zh-TW" altLang="en-US" sz="2400" b="1" dirty="0">
+              <a:solidFill>
+                <a:srgbClr val="FF0000"/>
+              </a:solidFill>
+            </a:endParaRPr>
+          </a:p>
+        </p:txBody>
+      </p:sp>
+    </p:spTree>
+    <p:extLst>
+      <p:ext uri="{BB962C8B-B14F-4D97-AF65-F5344CB8AC3E}">
+        <p14:creationId xmlns:p14="http://schemas.microsoft.com/office/powerpoint/2010/main" val="1012808163"/>
+      </p:ext>
+    </p:extLst>
+  </p:cSld>
+  <p:clrMapOvr>
+    <a:masterClrMapping/>
+  </p:clrMapOvr>
+</p:sld>
+</file>
+
+<file path=ppt/slides/slide6.xml><?xml version="1.0" encoding="utf-8"?>
+<p:sld xmlns:a="http://schemas.openxmlformats.org/drawingml/2006/main" xmlns:r="http://schemas.openxmlformats.org/officeDocument/2006/relationships" xmlns:p="http://schemas.openxmlformats.org/presentationml/2006/main">
+  <p:cSld>
+    <p:spTree>
+      <p:nvGrpSpPr>
+        <p:cNvPr id="1" name=""/>
+        <p:cNvGrpSpPr/>
+        <p:nvPr/>
+      </p:nvGrpSpPr>
+      <p:grpSpPr>
+        <a:xfrm>
+          <a:off x="0" y="0"/>
+          <a:ext cx="0" cy="0"/>
+          <a:chOff x="0" y="0"/>
+          <a:chExt cx="0" cy="0"/>
+        </a:xfrm>
+      </p:grpSpPr>
+      <p:sp>
+        <p:nvSpPr>
+          <p:cNvPr id="4" name="圓角矩形 3"/>
+          <p:cNvSpPr/>
+          <p:nvPr/>
+        </p:nvSpPr>
+        <p:spPr>
+          <a:xfrm>
+            <a:off x="2137990" y="116632"/>
+            <a:ext cx="4824536" cy="6624736"/>
+          </a:xfrm>
+          <a:prstGeom prst="roundRect">
+            <a:avLst/>
+          </a:prstGeom>
+        </p:spPr>
+        <p:style>
+          <a:lnRef idx="2">
+            <a:schemeClr val="accent1"/>
+          </a:lnRef>
+          <a:fillRef idx="1">
+            <a:schemeClr val="lt1"/>
+          </a:fillRef>
+          <a:effectRef idx="0">
+            <a:schemeClr val="accent1"/>
+          </a:effectRef>
+          <a:fontRef idx="minor">
+            <a:schemeClr val="dk1"/>
+          </a:fontRef>
+        </p:style>
+        <p:txBody>
+          <a:bodyPr rtlCol="0" anchor="ctr"/>
+          <a:lstStyle/>
+          <a:p>
+            <a:pPr algn="ctr"/>
+            <a:endParaRPr lang="zh-TW" altLang="en-US" dirty="0"/>
+          </a:p>
+        </p:txBody>
+      </p:sp>
+      <p:pic>
+        <p:nvPicPr>
+          <p:cNvPr id="1026" name="Picture 2" descr="http://icons.iconarchive.com/icons/cornmanthe3rd/plex/512/System-settings-icon.png"/>
+          <p:cNvPicPr>
+            <a:picLocks noChangeAspect="1" noChangeArrowheads="1"/>
+          </p:cNvPicPr>
+          <p:nvPr/>
+        </p:nvPicPr>
+        <p:blipFill>
+          <a:blip r:embed="rId2" cstate="print">
+            <a:extLst>
+              <a:ext uri="{28A0092B-C50C-407E-A947-70E740481C1C}">
+                <a14:useLocalDpi xmlns:a14="http://schemas.microsoft.com/office/drawing/2010/main" val="0"/>
+              </a:ext>
+            </a:extLst>
+          </a:blip>
+          <a:srcRect/>
+          <a:stretch>
+            <a:fillRect/>
+          </a:stretch>
+        </p:blipFill>
+        <p:spPr bwMode="auto">
+          <a:xfrm>
+            <a:off x="5724128" y="162034"/>
+            <a:ext cx="1008112" cy="1008112"/>
+          </a:xfrm>
+          <a:prstGeom prst="rect">
+            <a:avLst/>
+          </a:prstGeom>
+          <a:noFill/>
+          <a:extLst>
+            <a:ext uri="{909E8E84-426E-40DD-AFC4-6F175D3DCCD1}">
+              <a14:hiddenFill xmlns:a14="http://schemas.microsoft.com/office/drawing/2010/main">
+                <a:solidFill>
+                  <a:srgbClr val="FFFFFF"/>
+                </a:solidFill>
+              </a14:hiddenFill>
+            </a:ext>
+          </a:extLst>
+        </p:spPr>
+      </p:pic>
+      <p:pic>
+        <p:nvPicPr>
+          <p:cNvPr id="1028" name="Picture 4" descr="http://icons.iconarchive.com/icons/cornmanthe3rd/plex/128/System-documents-icon.png"/>
+          <p:cNvPicPr>
+            <a:picLocks noChangeAspect="1" noChangeArrowheads="1"/>
+          </p:cNvPicPr>
+          <p:nvPr/>
+        </p:nvPicPr>
+        <p:blipFill>
+          <a:blip r:embed="rId3">
+            <a:extLst>
+              <a:ext uri="{28A0092B-C50C-407E-A947-70E740481C1C}">
+                <a14:useLocalDpi xmlns:a14="http://schemas.microsoft.com/office/drawing/2010/main" val="0"/>
+              </a:ext>
+            </a:extLst>
+          </a:blip>
+          <a:srcRect/>
+          <a:stretch>
+            <a:fillRect/>
+          </a:stretch>
+        </p:blipFill>
+        <p:spPr bwMode="auto">
+          <a:xfrm>
+            <a:off x="3635896" y="271657"/>
+            <a:ext cx="788863" cy="788864"/>
+          </a:xfrm>
+          <a:prstGeom prst="rect">
+            <a:avLst/>
+          </a:prstGeom>
+          <a:noFill/>
+          <a:extLst>
+            <a:ext uri="{909E8E84-426E-40DD-AFC4-6F175D3DCCD1}">
+              <a14:hiddenFill xmlns:a14="http://schemas.microsoft.com/office/drawing/2010/main">
+                <a:solidFill>
+                  <a:srgbClr val="FFFFFF"/>
+                </a:solidFill>
+              </a14:hiddenFill>
+            </a:ext>
+          </a:extLst>
+        </p:spPr>
+      </p:pic>
+      <p:pic>
+        <p:nvPicPr>
+          <p:cNvPr id="1030" name="Picture 6" descr="http://icons.iconarchive.com/icons/cornmanthe3rd/plex/128/Utilities-tasks-icon.png"/>
+          <p:cNvPicPr>
+            <a:picLocks noChangeAspect="1" noChangeArrowheads="1"/>
+          </p:cNvPicPr>
+          <p:nvPr/>
+        </p:nvPicPr>
+        <p:blipFill>
+          <a:blip r:embed="rId4">
+            <a:extLst>
+              <a:ext uri="{28A0092B-C50C-407E-A947-70E740481C1C}">
+                <a14:useLocalDpi xmlns:a14="http://schemas.microsoft.com/office/drawing/2010/main" val="0"/>
+              </a:ext>
+            </a:extLst>
+          </a:blip>
+          <a:srcRect/>
+          <a:stretch>
+            <a:fillRect/>
+          </a:stretch>
+        </p:blipFill>
+        <p:spPr bwMode="auto">
+          <a:xfrm>
+            <a:off x="2483768" y="224477"/>
+            <a:ext cx="891802" cy="891803"/>
+          </a:xfrm>
+          <a:prstGeom prst="rect">
+            <a:avLst/>
+          </a:prstGeom>
+          <a:noFill/>
+          <a:extLst>
+            <a:ext uri="{909E8E84-426E-40DD-AFC4-6F175D3DCCD1}">
+              <a14:hiddenFill xmlns:a14="http://schemas.microsoft.com/office/drawing/2010/main">
+                <a:solidFill>
+                  <a:srgbClr val="FFFFFF"/>
+                </a:solidFill>
+              </a14:hiddenFill>
+            </a:ext>
+          </a:extLst>
+        </p:spPr>
+      </p:pic>
+      <p:pic>
+        <p:nvPicPr>
+          <p:cNvPr id="1032" name="Picture 8" descr="http://icons.iconarchive.com/icons/xenatt/the-circle/128/App-Messages-icon.png"/>
+          <p:cNvPicPr>
+            <a:picLocks noChangeAspect="1" noChangeArrowheads="1"/>
+          </p:cNvPicPr>
+          <p:nvPr/>
+        </p:nvPicPr>
+        <p:blipFill>
+          <a:blip r:embed="rId5">
+            <a:extLst>
+              <a:ext uri="{28A0092B-C50C-407E-A947-70E740481C1C}">
+                <a14:useLocalDpi xmlns:a14="http://schemas.microsoft.com/office/drawing/2010/main" val="0"/>
+              </a:ext>
+            </a:extLst>
+          </a:blip>
+          <a:srcRect/>
+          <a:stretch>
+            <a:fillRect/>
+          </a:stretch>
+        </p:blipFill>
+        <p:spPr bwMode="auto">
+          <a:xfrm>
+            <a:off x="4716016" y="215899"/>
+            <a:ext cx="900380" cy="900381"/>
+          </a:xfrm>
+          <a:prstGeom prst="rect">
+            <a:avLst/>
+          </a:prstGeom>
+          <a:noFill/>
+          <a:extLst>
+            <a:ext uri="{909E8E84-426E-40DD-AFC4-6F175D3DCCD1}">
+              <a14:hiddenFill xmlns:a14="http://schemas.microsoft.com/office/drawing/2010/main">
+                <a:solidFill>
+                  <a:srgbClr val="FFFFFF"/>
+                </a:solidFill>
+              </a14:hiddenFill>
+            </a:ext>
+          </a:extLst>
+        </p:spPr>
+      </p:pic>
+      <p:sp>
+        <p:nvSpPr>
+          <p:cNvPr id="2" name="圓角矩形 1"/>
+          <p:cNvSpPr/>
+          <p:nvPr/>
+        </p:nvSpPr>
+        <p:spPr>
+          <a:xfrm>
+            <a:off x="2137990" y="116632"/>
+            <a:ext cx="1497906" cy="1053514"/>
+          </a:xfrm>
+          <a:prstGeom prst="roundRect">
+            <a:avLst/>
+          </a:prstGeom>
+          <a:noFill/>
+        </p:spPr>
+        <p:style>
+          <a:lnRef idx="2">
+            <a:schemeClr val="accent2"/>
+          </a:lnRef>
+          <a:fillRef idx="1">
+            <a:schemeClr val="lt1"/>
+          </a:fillRef>
+          <a:effectRef idx="0">
+            <a:schemeClr val="accent2"/>
+          </a:effectRef>
+          <a:fontRef idx="minor">
+            <a:schemeClr val="dk1"/>
+          </a:fontRef>
+        </p:style>
+        <p:txBody>
+          <a:bodyPr rtlCol="0" anchor="ctr"/>
+          <a:lstStyle/>
+          <a:p>
+            <a:pPr algn="ctr"/>
+            <a:endParaRPr lang="zh-TW" altLang="en-US"/>
+          </a:p>
+        </p:txBody>
+      </p:sp>
+      <p:sp>
+        <p:nvSpPr>
+          <p:cNvPr id="12" name="文字方塊 11"/>
+          <p:cNvSpPr txBox="1"/>
+          <p:nvPr/>
+        </p:nvSpPr>
+        <p:spPr>
+          <a:xfrm>
+            <a:off x="95283" y="159023"/>
+            <a:ext cx="2050690" cy="461665"/>
+          </a:xfrm>
+          <a:prstGeom prst="rect">
+            <a:avLst/>
+          </a:prstGeom>
+          <a:noFill/>
+        </p:spPr>
+        <p:txBody>
+          <a:bodyPr wrap="none" rtlCol="0">
+            <a:spAutoFit/>
+          </a:bodyPr>
+          <a:lstStyle/>
+          <a:p>
+            <a:r>
+              <a:rPr lang="en-US" altLang="zh-TW" sz="2400" b="1" dirty="0" smtClean="0">
+                <a:solidFill>
+                  <a:srgbClr val="FF0000"/>
+                </a:solidFill>
+              </a:rPr>
+              <a:t>Schedule View</a:t>
+            </a:r>
+            <a:endParaRPr lang="zh-TW" altLang="en-US" sz="2400" b="1" dirty="0">
+              <a:solidFill>
+                <a:srgbClr val="FF0000"/>
+              </a:solidFill>
+            </a:endParaRPr>
+          </a:p>
+        </p:txBody>
+      </p:sp>
+      <p:sp>
+        <p:nvSpPr>
+          <p:cNvPr id="3" name="矩形 2"/>
+          <p:cNvSpPr/>
+          <p:nvPr/>
+        </p:nvSpPr>
+        <p:spPr>
+          <a:xfrm>
+            <a:off x="4194356" y="2478633"/>
+            <a:ext cx="1945899" cy="374303"/>
+          </a:xfrm>
+          <a:prstGeom prst="rect">
+            <a:avLst/>
+          </a:prstGeom>
+        </p:spPr>
+        <p:style>
+          <a:lnRef idx="2">
+            <a:schemeClr val="accent1"/>
+          </a:lnRef>
+          <a:fillRef idx="1">
+            <a:schemeClr val="lt1"/>
+          </a:fillRef>
+          <a:effectRef idx="0">
+            <a:schemeClr val="accent1"/>
+          </a:effectRef>
+          <a:fontRef idx="minor">
+            <a:schemeClr val="dk1"/>
+          </a:fontRef>
+        </p:style>
+        <p:txBody>
+          <a:bodyPr rtlCol="0" anchor="ctr"/>
+          <a:lstStyle/>
+          <a:p>
+            <a:pPr algn="ctr"/>
+            <a:endParaRPr lang="zh-TW" altLang="en-US"/>
+          </a:p>
+        </p:txBody>
+      </p:sp>
+      <p:sp>
+        <p:nvSpPr>
+          <p:cNvPr id="5" name="文字方塊 4"/>
+          <p:cNvSpPr txBox="1"/>
+          <p:nvPr/>
+        </p:nvSpPr>
+        <p:spPr>
+          <a:xfrm>
+            <a:off x="3197400" y="2483604"/>
+            <a:ext cx="882165" cy="369332"/>
+          </a:xfrm>
+          <a:prstGeom prst="rect">
+            <a:avLst/>
+          </a:prstGeom>
+          <a:noFill/>
+        </p:spPr>
+        <p:txBody>
+          <a:bodyPr wrap="none" rtlCol="0">
+            <a:spAutoFit/>
+          </a:bodyPr>
+          <a:lstStyle/>
+          <a:p>
+            <a:r>
+              <a:rPr lang="en-US" altLang="zh-TW" dirty="0" smtClean="0"/>
+              <a:t>Where:</a:t>
+            </a:r>
+            <a:endParaRPr lang="zh-TW" altLang="en-US" dirty="0"/>
+          </a:p>
+        </p:txBody>
+      </p:sp>
+      <p:sp>
+        <p:nvSpPr>
+          <p:cNvPr id="15" name="文字方塊 14"/>
+          <p:cNvSpPr txBox="1"/>
+          <p:nvPr/>
+        </p:nvSpPr>
+        <p:spPr>
+          <a:xfrm>
+            <a:off x="2943613" y="3054697"/>
+            <a:ext cx="1135952" cy="369332"/>
+          </a:xfrm>
+          <a:prstGeom prst="rect">
+            <a:avLst/>
+          </a:prstGeom>
+          <a:noFill/>
+        </p:spPr>
+        <p:txBody>
+          <a:bodyPr wrap="none" rtlCol="0">
+            <a:spAutoFit/>
+          </a:bodyPr>
+          <a:lstStyle/>
+          <a:p>
+            <a:r>
+              <a:rPr lang="en-US" altLang="zh-TW" dirty="0" smtClean="0"/>
+              <a:t>How long:</a:t>
+            </a:r>
+            <a:endParaRPr lang="zh-TW" altLang="en-US" dirty="0"/>
+          </a:p>
+        </p:txBody>
+      </p:sp>
+      <p:sp>
+        <p:nvSpPr>
+          <p:cNvPr id="17" name="矩形 16"/>
+          <p:cNvSpPr/>
+          <p:nvPr/>
+        </p:nvSpPr>
+        <p:spPr>
+          <a:xfrm>
+            <a:off x="4194356" y="3054697"/>
+            <a:ext cx="1961820" cy="374303"/>
+          </a:xfrm>
+          <a:prstGeom prst="rect">
+            <a:avLst/>
+          </a:prstGeom>
+        </p:spPr>
+        <p:style>
+          <a:lnRef idx="2">
+            <a:schemeClr val="accent1"/>
+          </a:lnRef>
+          <a:fillRef idx="1">
+            <a:schemeClr val="lt1"/>
+          </a:fillRef>
+          <a:effectRef idx="0">
+            <a:schemeClr val="accent1"/>
+          </a:effectRef>
+          <a:fontRef idx="minor">
+            <a:schemeClr val="dk1"/>
+          </a:fontRef>
+        </p:style>
+        <p:txBody>
+          <a:bodyPr rtlCol="0" anchor="ctr"/>
+          <a:lstStyle/>
+          <a:p>
+            <a:pPr algn="ctr"/>
+            <a:endParaRPr lang="zh-TW" altLang="en-US"/>
+          </a:p>
+        </p:txBody>
+      </p:sp>
+      <p:sp>
+        <p:nvSpPr>
+          <p:cNvPr id="19" name="文字方塊 18"/>
+          <p:cNvSpPr txBox="1"/>
+          <p:nvPr/>
+        </p:nvSpPr>
+        <p:spPr>
+          <a:xfrm>
+            <a:off x="2843808" y="3630761"/>
+            <a:ext cx="1256178" cy="369332"/>
+          </a:xfrm>
+          <a:prstGeom prst="rect">
+            <a:avLst/>
+          </a:prstGeom>
+          <a:noFill/>
+        </p:spPr>
+        <p:txBody>
+          <a:bodyPr wrap="none" rtlCol="0">
+            <a:spAutoFit/>
+          </a:bodyPr>
+          <a:lstStyle/>
+          <a:p>
+            <a:r>
+              <a:rPr lang="en-US" altLang="zh-TW" dirty="0" smtClean="0"/>
+              <a:t>How much:</a:t>
+            </a:r>
+            <a:endParaRPr lang="zh-TW" altLang="en-US" dirty="0"/>
+          </a:p>
+        </p:txBody>
+      </p:sp>
+      <p:sp>
+        <p:nvSpPr>
+          <p:cNvPr id="20" name="矩形 19"/>
+          <p:cNvSpPr/>
+          <p:nvPr/>
+        </p:nvSpPr>
+        <p:spPr>
+          <a:xfrm>
+            <a:off x="4194356" y="3630761"/>
+            <a:ext cx="1947441" cy="374303"/>
+          </a:xfrm>
+          <a:prstGeom prst="rect">
+            <a:avLst/>
+          </a:prstGeom>
+        </p:spPr>
+        <p:style>
+          <a:lnRef idx="2">
+            <a:schemeClr val="accent1"/>
+          </a:lnRef>
+          <a:fillRef idx="1">
+            <a:schemeClr val="lt1"/>
+          </a:fillRef>
+          <a:effectRef idx="0">
+            <a:schemeClr val="accent1"/>
+          </a:effectRef>
+          <a:fontRef idx="minor">
+            <a:schemeClr val="dk1"/>
+          </a:fontRef>
+        </p:style>
+        <p:txBody>
+          <a:bodyPr rtlCol="0" anchor="ctr"/>
+          <a:lstStyle/>
+          <a:p>
+            <a:pPr algn="ctr"/>
+            <a:endParaRPr lang="zh-TW" altLang="en-US"/>
+          </a:p>
+        </p:txBody>
+      </p:sp>
+      <p:sp>
+        <p:nvSpPr>
+          <p:cNvPr id="7" name="圓角矩形 6"/>
+          <p:cNvSpPr/>
+          <p:nvPr/>
+        </p:nvSpPr>
+        <p:spPr>
+          <a:xfrm>
+            <a:off x="3511589" y="4365104"/>
+            <a:ext cx="2104807" cy="576064"/>
+          </a:xfrm>
+          <a:prstGeom prst="roundRect">
+            <a:avLst/>
+          </a:prstGeom>
+        </p:spPr>
+        <p:style>
+          <a:lnRef idx="2">
+            <a:schemeClr val="accent1">
+              <a:shade val="50000"/>
+            </a:schemeClr>
+          </a:lnRef>
+          <a:fillRef idx="1">
+            <a:schemeClr val="accent1"/>
+          </a:fillRef>
+          <a:effectRef idx="0">
+            <a:schemeClr val="accent1"/>
+          </a:effectRef>
+          <a:fontRef idx="minor">
+            <a:schemeClr val="lt1"/>
+          </a:fontRef>
+        </p:style>
+        <p:txBody>
+          <a:bodyPr rtlCol="0" anchor="ctr"/>
+          <a:lstStyle/>
+          <a:p>
+            <a:pPr algn="ctr"/>
+            <a:r>
+              <a:rPr lang="en-US" altLang="zh-TW" dirty="0" smtClean="0"/>
+              <a:t>Schedule</a:t>
+            </a:r>
+            <a:endParaRPr lang="zh-TW" altLang="en-US" dirty="0"/>
+          </a:p>
+        </p:txBody>
+      </p:sp>
+      <p:sp>
+        <p:nvSpPr>
+          <p:cNvPr id="8" name="文字方塊 7"/>
+          <p:cNvSpPr txBox="1"/>
+          <p:nvPr/>
+        </p:nvSpPr>
+        <p:spPr>
+          <a:xfrm>
+            <a:off x="2570721" y="1869758"/>
+            <a:ext cx="1529265" cy="369332"/>
+          </a:xfrm>
+          <a:prstGeom prst="rect">
+            <a:avLst/>
+          </a:prstGeom>
+          <a:noFill/>
+        </p:spPr>
+        <p:txBody>
+          <a:bodyPr wrap="none" rtlCol="0">
+            <a:spAutoFit/>
+          </a:bodyPr>
+          <a:lstStyle/>
+          <a:p>
+            <a:r>
+              <a:rPr lang="en-US" altLang="zh-TW" dirty="0" smtClean="0"/>
+              <a:t>People Group:</a:t>
+            </a:r>
+            <a:endParaRPr lang="zh-TW" altLang="en-US" dirty="0"/>
+          </a:p>
+        </p:txBody>
+      </p:sp>
+      <p:sp>
+        <p:nvSpPr>
+          <p:cNvPr id="22" name="矩形 21"/>
+          <p:cNvSpPr/>
+          <p:nvPr/>
+        </p:nvSpPr>
+        <p:spPr>
+          <a:xfrm>
+            <a:off x="4194357" y="1916832"/>
+            <a:ext cx="1961820" cy="374303"/>
+          </a:xfrm>
+          <a:prstGeom prst="rect">
+            <a:avLst/>
+          </a:prstGeom>
+        </p:spPr>
+        <p:style>
+          <a:lnRef idx="2">
+            <a:schemeClr val="accent1"/>
+          </a:lnRef>
+          <a:fillRef idx="1">
+            <a:schemeClr val="lt1"/>
+          </a:fillRef>
+          <a:effectRef idx="0">
+            <a:schemeClr val="accent1"/>
+          </a:effectRef>
+          <a:fontRef idx="minor">
+            <a:schemeClr val="dk1"/>
+          </a:fontRef>
+        </p:style>
+        <p:txBody>
+          <a:bodyPr rtlCol="0" anchor="ctr"/>
+          <a:lstStyle/>
+          <a:p>
+            <a:pPr algn="ctr"/>
+            <a:endParaRPr lang="zh-TW" altLang="en-US"/>
+          </a:p>
+        </p:txBody>
+      </p:sp>
+      <p:sp>
+        <p:nvSpPr>
+          <p:cNvPr id="9" name="等腰三角形 8"/>
+          <p:cNvSpPr/>
+          <p:nvPr/>
+        </p:nvSpPr>
+        <p:spPr>
+          <a:xfrm flipV="1">
+            <a:off x="5996239" y="2146964"/>
+            <a:ext cx="288032" cy="184252"/>
+          </a:xfrm>
+          <a:prstGeom prst="triangle">
+            <a:avLst/>
+          </a:prstGeom>
+        </p:spPr>
+        <p:style>
+          <a:lnRef idx="2">
+            <a:schemeClr val="accent1">
+              <a:shade val="50000"/>
+            </a:schemeClr>
+          </a:lnRef>
+          <a:fillRef idx="1">
+            <a:schemeClr val="accent1"/>
+          </a:fillRef>
+          <a:effectRef idx="0">
+            <a:schemeClr val="accent1"/>
+          </a:effectRef>
+          <a:fontRef idx="minor">
+            <a:schemeClr val="lt1"/>
+          </a:fontRef>
+        </p:style>
+        <p:txBody>
+          <a:bodyPr rtlCol="0" anchor="ctr"/>
+          <a:lstStyle/>
+          <a:p>
+            <a:pPr algn="ctr"/>
+            <a:endParaRPr lang="zh-TW" altLang="en-US"/>
+          </a:p>
+        </p:txBody>
+      </p:sp>
+    </p:spTree>
+    <p:extLst>
+      <p:ext uri="{BB962C8B-B14F-4D97-AF65-F5344CB8AC3E}">
+        <p14:creationId xmlns:p14="http://schemas.microsoft.com/office/powerpoint/2010/main" val="3281842572"/>
+      </p:ext>
+    </p:extLst>
+  </p:cSld>
+  <p:clrMapOvr>
+    <a:masterClrMapping/>
+  </p:clrMapOvr>
+</p:sld>
+</file>
+
+<file path=ppt/slides/slide7.xml><?xml version="1.0" encoding="utf-8"?>
+<p:sld xmlns:a="http://schemas.openxmlformats.org/drawingml/2006/main" xmlns:r="http://schemas.openxmlformats.org/officeDocument/2006/relationships" xmlns:p="http://schemas.openxmlformats.org/presentationml/2006/main">
+  <p:cSld>
+    <p:spTree>
+      <p:nvGrpSpPr>
+        <p:cNvPr id="1" name=""/>
+        <p:cNvGrpSpPr/>
+        <p:nvPr/>
+      </p:nvGrpSpPr>
+      <p:grpSpPr>
+        <a:xfrm>
+          <a:off x="0" y="0"/>
+          <a:ext cx="0" cy="0"/>
+          <a:chOff x="0" y="0"/>
+          <a:chExt cx="0" cy="0"/>
+        </a:xfrm>
+      </p:grpSpPr>
+      <p:sp>
+        <p:nvSpPr>
+          <p:cNvPr id="4" name="圓角矩形 3"/>
+          <p:cNvSpPr/>
+          <p:nvPr/>
+        </p:nvSpPr>
+        <p:spPr>
+          <a:xfrm>
+            <a:off x="2137990" y="116632"/>
+            <a:ext cx="4824536" cy="6624736"/>
+          </a:xfrm>
+          <a:prstGeom prst="roundRect">
+            <a:avLst/>
+          </a:prstGeom>
+        </p:spPr>
+        <p:style>
+          <a:lnRef idx="2">
+            <a:schemeClr val="accent1"/>
+          </a:lnRef>
+          <a:fillRef idx="1">
+            <a:schemeClr val="lt1"/>
+          </a:fillRef>
+          <a:effectRef idx="0">
+            <a:schemeClr val="accent1"/>
+          </a:effectRef>
+          <a:fontRef idx="minor">
+            <a:schemeClr val="dk1"/>
+          </a:fontRef>
+        </p:style>
+        <p:txBody>
+          <a:bodyPr rtlCol="0" anchor="ctr"/>
+          <a:lstStyle/>
+          <a:p>
+            <a:pPr algn="ctr"/>
+            <a:endParaRPr lang="zh-TW" altLang="en-US" dirty="0"/>
+          </a:p>
+        </p:txBody>
+      </p:sp>
+      <p:pic>
+        <p:nvPicPr>
+          <p:cNvPr id="1026" name="Picture 2" descr="http://icons.iconarchive.com/icons/cornmanthe3rd/plex/512/System-settings-icon.png"/>
+          <p:cNvPicPr>
+            <a:picLocks noChangeAspect="1" noChangeArrowheads="1"/>
+          </p:cNvPicPr>
+          <p:nvPr/>
+        </p:nvPicPr>
+        <p:blipFill>
+          <a:blip r:embed="rId2" cstate="print">
+            <a:extLst>
+              <a:ext uri="{28A0092B-C50C-407E-A947-70E740481C1C}">
+                <a14:useLocalDpi xmlns:a14="http://schemas.microsoft.com/office/drawing/2010/main" val="0"/>
+              </a:ext>
+            </a:extLst>
+          </a:blip>
+          <a:srcRect/>
+          <a:stretch>
+            <a:fillRect/>
+          </a:stretch>
+        </p:blipFill>
+        <p:spPr bwMode="auto">
+          <a:xfrm>
+            <a:off x="5724128" y="162034"/>
+            <a:ext cx="1008112" cy="1008112"/>
+          </a:xfrm>
+          <a:prstGeom prst="rect">
+            <a:avLst/>
+          </a:prstGeom>
+          <a:noFill/>
+          <a:extLst>
+            <a:ext uri="{909E8E84-426E-40DD-AFC4-6F175D3DCCD1}">
+              <a14:hiddenFill xmlns:a14="http://schemas.microsoft.com/office/drawing/2010/main">
+                <a:solidFill>
+                  <a:srgbClr val="FFFFFF"/>
+                </a:solidFill>
+              </a14:hiddenFill>
+            </a:ext>
+          </a:extLst>
+        </p:spPr>
+      </p:pic>
+      <p:pic>
+        <p:nvPicPr>
+          <p:cNvPr id="1028" name="Picture 4" descr="http://icons.iconarchive.com/icons/cornmanthe3rd/plex/128/System-documents-icon.png"/>
+          <p:cNvPicPr>
+            <a:picLocks noChangeAspect="1" noChangeArrowheads="1"/>
+          </p:cNvPicPr>
+          <p:nvPr/>
+        </p:nvPicPr>
+        <p:blipFill>
+          <a:blip r:embed="rId3">
+            <a:extLst>
+              <a:ext uri="{28A0092B-C50C-407E-A947-70E740481C1C}">
+                <a14:useLocalDpi xmlns:a14="http://schemas.microsoft.com/office/drawing/2010/main" val="0"/>
+              </a:ext>
+            </a:extLst>
+          </a:blip>
+          <a:srcRect/>
+          <a:stretch>
+            <a:fillRect/>
+          </a:stretch>
+        </p:blipFill>
+        <p:spPr bwMode="auto">
+          <a:xfrm>
+            <a:off x="3635896" y="271657"/>
+            <a:ext cx="788863" cy="788864"/>
+          </a:xfrm>
+          <a:prstGeom prst="rect">
+            <a:avLst/>
+          </a:prstGeom>
+          <a:noFill/>
+          <a:extLst>
+            <a:ext uri="{909E8E84-426E-40DD-AFC4-6F175D3DCCD1}">
+              <a14:hiddenFill xmlns:a14="http://schemas.microsoft.com/office/drawing/2010/main">
+                <a:solidFill>
+                  <a:srgbClr val="FFFFFF"/>
+                </a:solidFill>
+              </a14:hiddenFill>
+            </a:ext>
+          </a:extLst>
+        </p:spPr>
+      </p:pic>
+      <p:pic>
+        <p:nvPicPr>
+          <p:cNvPr id="1030" name="Picture 6" descr="http://icons.iconarchive.com/icons/cornmanthe3rd/plex/128/Utilities-tasks-icon.png"/>
+          <p:cNvPicPr>
+            <a:picLocks noChangeAspect="1" noChangeArrowheads="1"/>
+          </p:cNvPicPr>
+          <p:nvPr/>
+        </p:nvPicPr>
+        <p:blipFill>
+          <a:blip r:embed="rId4">
+            <a:extLst>
+              <a:ext uri="{28A0092B-C50C-407E-A947-70E740481C1C}">
+                <a14:useLocalDpi xmlns:a14="http://schemas.microsoft.com/office/drawing/2010/main" val="0"/>
+              </a:ext>
+            </a:extLst>
+          </a:blip>
+          <a:srcRect/>
+          <a:stretch>
+            <a:fillRect/>
+          </a:stretch>
+        </p:blipFill>
+        <p:spPr bwMode="auto">
+          <a:xfrm>
+            <a:off x="2483768" y="224477"/>
+            <a:ext cx="891802" cy="891803"/>
+          </a:xfrm>
+          <a:prstGeom prst="rect">
+            <a:avLst/>
+          </a:prstGeom>
+          <a:noFill/>
+          <a:extLst>
+            <a:ext uri="{909E8E84-426E-40DD-AFC4-6F175D3DCCD1}">
+              <a14:hiddenFill xmlns:a14="http://schemas.microsoft.com/office/drawing/2010/main">
+                <a:solidFill>
+                  <a:srgbClr val="FFFFFF"/>
+                </a:solidFill>
+              </a14:hiddenFill>
+            </a:ext>
+          </a:extLst>
+        </p:spPr>
+      </p:pic>
+      <p:pic>
+        <p:nvPicPr>
+          <p:cNvPr id="1032" name="Picture 8" descr="http://icons.iconarchive.com/icons/xenatt/the-circle/128/App-Messages-icon.png"/>
+          <p:cNvPicPr>
+            <a:picLocks noChangeAspect="1" noChangeArrowheads="1"/>
+          </p:cNvPicPr>
+          <p:nvPr/>
+        </p:nvPicPr>
+        <p:blipFill>
+          <a:blip r:embed="rId5">
+            <a:extLst>
+              <a:ext uri="{28A0092B-C50C-407E-A947-70E740481C1C}">
+                <a14:useLocalDpi xmlns:a14="http://schemas.microsoft.com/office/drawing/2010/main" val="0"/>
+              </a:ext>
+            </a:extLst>
+          </a:blip>
+          <a:srcRect/>
+          <a:stretch>
+            <a:fillRect/>
+          </a:stretch>
+        </p:blipFill>
+        <p:spPr bwMode="auto">
+          <a:xfrm>
+            <a:off x="4716016" y="215899"/>
+            <a:ext cx="900380" cy="900381"/>
+          </a:xfrm>
+          <a:prstGeom prst="rect">
+            <a:avLst/>
+          </a:prstGeom>
+          <a:noFill/>
+          <a:extLst>
+            <a:ext uri="{909E8E84-426E-40DD-AFC4-6F175D3DCCD1}">
+              <a14:hiddenFill xmlns:a14="http://schemas.microsoft.com/office/drawing/2010/main">
+                <a:solidFill>
+                  <a:srgbClr val="FFFFFF"/>
+                </a:solidFill>
+              </a14:hiddenFill>
+            </a:ext>
+          </a:extLst>
+        </p:spPr>
+      </p:pic>
+      <p:sp>
+        <p:nvSpPr>
+          <p:cNvPr id="2" name="圓角矩形 1"/>
+          <p:cNvSpPr/>
+          <p:nvPr/>
+        </p:nvSpPr>
+        <p:spPr>
+          <a:xfrm>
+            <a:off x="2137990" y="116632"/>
+            <a:ext cx="1497906" cy="1053514"/>
+          </a:xfrm>
+          <a:prstGeom prst="roundRect">
+            <a:avLst/>
+          </a:prstGeom>
+          <a:noFill/>
+        </p:spPr>
+        <p:style>
+          <a:lnRef idx="2">
+            <a:schemeClr val="accent2"/>
+          </a:lnRef>
+          <a:fillRef idx="1">
+            <a:schemeClr val="lt1"/>
+          </a:fillRef>
+          <a:effectRef idx="0">
+            <a:schemeClr val="accent2"/>
+          </a:effectRef>
+          <a:fontRef idx="minor">
+            <a:schemeClr val="dk1"/>
+          </a:fontRef>
+        </p:style>
+        <p:txBody>
+          <a:bodyPr rtlCol="0" anchor="ctr"/>
+          <a:lstStyle/>
+          <a:p>
+            <a:pPr algn="ctr"/>
+            <a:endParaRPr lang="zh-TW" altLang="en-US"/>
+          </a:p>
+        </p:txBody>
+      </p:sp>
+      <p:sp>
+        <p:nvSpPr>
+          <p:cNvPr id="12" name="文字方塊 11"/>
+          <p:cNvSpPr txBox="1"/>
+          <p:nvPr/>
+        </p:nvSpPr>
+        <p:spPr>
+          <a:xfrm>
+            <a:off x="95283" y="159023"/>
+            <a:ext cx="2050690" cy="461665"/>
+          </a:xfrm>
+          <a:prstGeom prst="rect">
+            <a:avLst/>
+          </a:prstGeom>
+          <a:noFill/>
+        </p:spPr>
+        <p:txBody>
+          <a:bodyPr wrap="none" rtlCol="0">
+            <a:spAutoFit/>
+          </a:bodyPr>
+          <a:lstStyle/>
+          <a:p>
+            <a:r>
+              <a:rPr lang="en-US" altLang="zh-TW" sz="2400" b="1" dirty="0" smtClean="0">
+                <a:solidFill>
+                  <a:srgbClr val="FF0000"/>
+                </a:solidFill>
+              </a:rPr>
+              <a:t>Schedule View</a:t>
+            </a:r>
+            <a:endParaRPr lang="zh-TW" altLang="en-US" sz="2400" b="1" dirty="0">
+              <a:solidFill>
+                <a:srgbClr val="FF0000"/>
+              </a:solidFill>
+            </a:endParaRPr>
+          </a:p>
+        </p:txBody>
+      </p:sp>
+      <p:sp>
+        <p:nvSpPr>
+          <p:cNvPr id="6" name="文字方塊 5"/>
+          <p:cNvSpPr txBox="1"/>
+          <p:nvPr/>
+        </p:nvSpPr>
+        <p:spPr>
+          <a:xfrm>
+            <a:off x="2631230" y="1588150"/>
+            <a:ext cx="989758" cy="369332"/>
+          </a:xfrm>
+          <a:prstGeom prst="rect">
+            <a:avLst/>
+          </a:prstGeom>
+          <a:noFill/>
+        </p:spPr>
+        <p:txBody>
+          <a:bodyPr wrap="none" rtlCol="0">
+            <a:spAutoFit/>
+          </a:bodyPr>
+          <a:lstStyle/>
+          <a:p>
+            <a:r>
+              <a:rPr lang="en-US" altLang="zh-TW" dirty="0" smtClean="0"/>
+              <a:t>First Day</a:t>
+            </a:r>
+            <a:endParaRPr lang="zh-TW" altLang="en-US" dirty="0"/>
+          </a:p>
+        </p:txBody>
+      </p:sp>
+      <p:sp>
+        <p:nvSpPr>
+          <p:cNvPr id="21" name="文字方塊 20"/>
+          <p:cNvSpPr txBox="1"/>
+          <p:nvPr/>
+        </p:nvSpPr>
+        <p:spPr>
+          <a:xfrm>
+            <a:off x="2627784" y="3057143"/>
+            <a:ext cx="1273297" cy="369332"/>
+          </a:xfrm>
+          <a:prstGeom prst="rect">
+            <a:avLst/>
+          </a:prstGeom>
+          <a:noFill/>
+        </p:spPr>
+        <p:txBody>
+          <a:bodyPr wrap="none" rtlCol="0">
+            <a:spAutoFit/>
+          </a:bodyPr>
+          <a:lstStyle/>
+          <a:p>
+            <a:r>
+              <a:rPr lang="en-US" altLang="zh-TW" dirty="0" smtClean="0"/>
+              <a:t>Second Day</a:t>
+            </a:r>
+            <a:endParaRPr lang="zh-TW" altLang="en-US" dirty="0"/>
+          </a:p>
+        </p:txBody>
+      </p:sp>
+      <p:sp>
+        <p:nvSpPr>
+          <p:cNvPr id="10" name="文字方塊 9"/>
+          <p:cNvSpPr txBox="1"/>
+          <p:nvPr/>
+        </p:nvSpPr>
+        <p:spPr>
+          <a:xfrm>
+            <a:off x="4307884" y="1980352"/>
+            <a:ext cx="242374" cy="923330"/>
+          </a:xfrm>
+          <a:prstGeom prst="rect">
+            <a:avLst/>
+          </a:prstGeom>
+          <a:noFill/>
+        </p:spPr>
+        <p:txBody>
+          <a:bodyPr wrap="none" rtlCol="0">
+            <a:spAutoFit/>
+          </a:bodyPr>
+          <a:lstStyle/>
+          <a:p>
+            <a:r>
+              <a:rPr lang="en-US" altLang="zh-TW" dirty="0" smtClean="0"/>
+              <a:t>.</a:t>
+            </a:r>
+          </a:p>
+          <a:p>
+            <a:r>
+              <a:rPr lang="en-US" altLang="zh-TW" dirty="0" smtClean="0"/>
+              <a:t>.</a:t>
+            </a:r>
+          </a:p>
+          <a:p>
+            <a:r>
+              <a:rPr lang="en-US" altLang="zh-TW" dirty="0"/>
+              <a:t>.</a:t>
+            </a:r>
+            <a:endParaRPr lang="zh-TW" altLang="en-US" dirty="0"/>
+          </a:p>
+        </p:txBody>
+      </p:sp>
+      <p:sp>
+        <p:nvSpPr>
+          <p:cNvPr id="23" name="文字方塊 22"/>
+          <p:cNvSpPr txBox="1"/>
+          <p:nvPr/>
+        </p:nvSpPr>
+        <p:spPr>
+          <a:xfrm>
+            <a:off x="4283968" y="4149080"/>
+            <a:ext cx="242374" cy="923330"/>
+          </a:xfrm>
+          <a:prstGeom prst="rect">
+            <a:avLst/>
+          </a:prstGeom>
+          <a:noFill/>
+        </p:spPr>
+        <p:txBody>
+          <a:bodyPr wrap="none" rtlCol="0">
+            <a:spAutoFit/>
+          </a:bodyPr>
+          <a:lstStyle/>
+          <a:p>
+            <a:r>
+              <a:rPr lang="en-US" altLang="zh-TW" dirty="0" smtClean="0"/>
+              <a:t>.</a:t>
+            </a:r>
+          </a:p>
+          <a:p>
+            <a:r>
+              <a:rPr lang="en-US" altLang="zh-TW" dirty="0" smtClean="0"/>
+              <a:t>.</a:t>
+            </a:r>
+          </a:p>
+          <a:p>
+            <a:r>
+              <a:rPr lang="en-US" altLang="zh-TW" dirty="0"/>
+              <a:t>.</a:t>
+            </a:r>
+            <a:endParaRPr lang="zh-TW" altLang="en-US" dirty="0"/>
+          </a:p>
+        </p:txBody>
+      </p:sp>
+      <p:sp>
+        <p:nvSpPr>
+          <p:cNvPr id="11" name="雲朵形圖說文字 10"/>
+          <p:cNvSpPr/>
+          <p:nvPr/>
+        </p:nvSpPr>
+        <p:spPr>
+          <a:xfrm>
+            <a:off x="5616396" y="4610745"/>
+            <a:ext cx="3078202" cy="1944216"/>
+          </a:xfrm>
+          <a:prstGeom prst="cloudCallout">
+            <a:avLst>
+              <a:gd name="adj1" fmla="val -121777"/>
+              <a:gd name="adj2" fmla="val 43393"/>
+            </a:avLst>
+          </a:prstGeom>
+        </p:spPr>
+        <p:style>
+          <a:lnRef idx="2">
+            <a:schemeClr val="accent2"/>
+          </a:lnRef>
+          <a:fillRef idx="1">
+            <a:schemeClr val="lt1"/>
+          </a:fillRef>
+          <a:effectRef idx="0">
+            <a:schemeClr val="accent2"/>
+          </a:effectRef>
+          <a:fontRef idx="minor">
+            <a:schemeClr val="dk1"/>
+          </a:fontRef>
+        </p:style>
+        <p:txBody>
+          <a:bodyPr rtlCol="0" anchor="ctr"/>
+          <a:lstStyle/>
+          <a:p>
+            <a:pPr algn="ctr"/>
+            <a:r>
+              <a:rPr lang="en-US" altLang="zh-TW" dirty="0" smtClean="0"/>
+              <a:t>Using Content Menu to store plan</a:t>
+            </a:r>
+            <a:endParaRPr lang="zh-TW" altLang="en-US" dirty="0"/>
+          </a:p>
+        </p:txBody>
+      </p:sp>
+      <p:sp>
+        <p:nvSpPr>
+          <p:cNvPr id="13" name="文字方塊 12"/>
+          <p:cNvSpPr txBox="1"/>
+          <p:nvPr/>
+        </p:nvSpPr>
+        <p:spPr>
+          <a:xfrm>
+            <a:off x="2942527" y="6237312"/>
+            <a:ext cx="343364" cy="369332"/>
+          </a:xfrm>
+          <a:prstGeom prst="rect">
+            <a:avLst/>
+          </a:prstGeom>
+          <a:noFill/>
+        </p:spPr>
+        <p:txBody>
+          <a:bodyPr wrap="none" rtlCol="0">
+            <a:spAutoFit/>
+          </a:bodyPr>
+          <a:lstStyle/>
+          <a:p>
+            <a:r>
+              <a:rPr lang="en-US" altLang="zh-TW" dirty="0" smtClean="0"/>
+              <a:t>…</a:t>
+            </a:r>
+            <a:endParaRPr lang="zh-TW" altLang="en-US" dirty="0"/>
+          </a:p>
+        </p:txBody>
+      </p:sp>
+      <p:sp>
+        <p:nvSpPr>
+          <p:cNvPr id="25" name="雲朵形圖說文字 24"/>
+          <p:cNvSpPr/>
+          <p:nvPr/>
+        </p:nvSpPr>
+        <p:spPr>
+          <a:xfrm>
+            <a:off x="6065798" y="243057"/>
+            <a:ext cx="3078202" cy="1944216"/>
+          </a:xfrm>
+          <a:prstGeom prst="cloudCallout">
+            <a:avLst>
+              <a:gd name="adj1" fmla="val -86966"/>
+              <a:gd name="adj2" fmla="val 59560"/>
+            </a:avLst>
+          </a:prstGeom>
+        </p:spPr>
+        <p:style>
+          <a:lnRef idx="2">
+            <a:schemeClr val="accent2"/>
+          </a:lnRef>
+          <a:fillRef idx="1">
+            <a:schemeClr val="lt1"/>
+          </a:fillRef>
+          <a:effectRef idx="0">
+            <a:schemeClr val="accent2"/>
+          </a:effectRef>
+          <a:fontRef idx="minor">
+            <a:schemeClr val="dk1"/>
+          </a:fontRef>
+        </p:style>
+        <p:txBody>
+          <a:bodyPr rtlCol="0" anchor="ctr"/>
+          <a:lstStyle/>
+          <a:p>
+            <a:pPr algn="ctr"/>
+            <a:r>
+              <a:rPr lang="en-US" altLang="zh-TW" dirty="0" smtClean="0"/>
+              <a:t>User can change spot, hotel… immediately and plan will be changed by system dynamically</a:t>
+            </a:r>
+            <a:endParaRPr lang="zh-TW" altLang="en-US" dirty="0"/>
+          </a:p>
+        </p:txBody>
+      </p:sp>
+    </p:spTree>
+    <p:extLst>
+      <p:ext uri="{BB962C8B-B14F-4D97-AF65-F5344CB8AC3E}">
+        <p14:creationId xmlns:p14="http://schemas.microsoft.com/office/powerpoint/2010/main" val="1934363085"/>
+      </p:ext>
+    </p:extLst>
+  </p:cSld>
+  <p:clrMapOvr>
+    <a:masterClrMapping/>
+  </p:clrMapOvr>
+</p:sld>
 </file>
 
 <file path=ppt/theme/theme1.xml><?xml version="1.0" encoding="utf-8"?>

</xml_diff>